<commit_message>
- Updated presentations and UML. - Updated server API.
</commit_message>
<xml_diff>
--- a/doc/presentaciones/DDSCS.pptx
+++ b/doc/presentaciones/DDSCS.pptx
@@ -288,7 +288,8 @@
           <a:p>
             <a:fld id="{72D6C191-6891-4FF3-829D-63122C75BCB4}" type="datetimeFigureOut">
               <a:rPr lang="es-ES" smtClean="0"/>
-              <a:t>21/06/2012</a:t>
+              <a:pPr/>
+              <a:t>18/09/2012</a:t>
             </a:fld>
             <a:endParaRPr lang="es-ES"/>
           </a:p>
@@ -330,6 +331,7 @@
           <a:p>
             <a:fld id="{07125E69-B755-4441-B9CD-F24C22F498DD}" type="slidenum">
               <a:rPr lang="es-ES" smtClean="0"/>
+              <a:pPr/>
               <a:t>‹Nº›</a:t>
             </a:fld>
             <a:endParaRPr lang="es-ES"/>
@@ -453,7 +455,8 @@
           <a:p>
             <a:fld id="{72D6C191-6891-4FF3-829D-63122C75BCB4}" type="datetimeFigureOut">
               <a:rPr lang="es-ES" smtClean="0"/>
-              <a:t>21/06/2012</a:t>
+              <a:pPr/>
+              <a:t>18/09/2012</a:t>
             </a:fld>
             <a:endParaRPr lang="es-ES"/>
           </a:p>
@@ -495,6 +498,7 @@
           <a:p>
             <a:fld id="{07125E69-B755-4441-B9CD-F24C22F498DD}" type="slidenum">
               <a:rPr lang="es-ES" smtClean="0"/>
+              <a:pPr/>
               <a:t>‹Nº›</a:t>
             </a:fld>
             <a:endParaRPr lang="es-ES"/>
@@ -628,7 +632,8 @@
           <a:p>
             <a:fld id="{72D6C191-6891-4FF3-829D-63122C75BCB4}" type="datetimeFigureOut">
               <a:rPr lang="es-ES" smtClean="0"/>
-              <a:t>21/06/2012</a:t>
+              <a:pPr/>
+              <a:t>18/09/2012</a:t>
             </a:fld>
             <a:endParaRPr lang="es-ES"/>
           </a:p>
@@ -670,6 +675,7 @@
           <a:p>
             <a:fld id="{07125E69-B755-4441-B9CD-F24C22F498DD}" type="slidenum">
               <a:rPr lang="es-ES" smtClean="0"/>
+              <a:pPr/>
               <a:t>‹Nº›</a:t>
             </a:fld>
             <a:endParaRPr lang="es-ES"/>
@@ -793,7 +799,8 @@
           <a:p>
             <a:fld id="{72D6C191-6891-4FF3-829D-63122C75BCB4}" type="datetimeFigureOut">
               <a:rPr lang="es-ES" smtClean="0"/>
-              <a:t>21/06/2012</a:t>
+              <a:pPr/>
+              <a:t>18/09/2012</a:t>
             </a:fld>
             <a:endParaRPr lang="es-ES"/>
           </a:p>
@@ -835,6 +842,7 @@
           <a:p>
             <a:fld id="{07125E69-B755-4441-B9CD-F24C22F498DD}" type="slidenum">
               <a:rPr lang="es-ES" smtClean="0"/>
+              <a:pPr/>
               <a:t>‹Nº›</a:t>
             </a:fld>
             <a:endParaRPr lang="es-ES"/>
@@ -1035,7 +1043,8 @@
           <a:p>
             <a:fld id="{72D6C191-6891-4FF3-829D-63122C75BCB4}" type="datetimeFigureOut">
               <a:rPr lang="es-ES" smtClean="0"/>
-              <a:t>21/06/2012</a:t>
+              <a:pPr/>
+              <a:t>18/09/2012</a:t>
             </a:fld>
             <a:endParaRPr lang="es-ES"/>
           </a:p>
@@ -1077,6 +1086,7 @@
           <a:p>
             <a:fld id="{07125E69-B755-4441-B9CD-F24C22F498DD}" type="slidenum">
               <a:rPr lang="es-ES" smtClean="0"/>
+              <a:pPr/>
               <a:t>‹Nº›</a:t>
             </a:fld>
             <a:endParaRPr lang="es-ES"/>
@@ -1299,7 +1309,8 @@
           <a:p>
             <a:fld id="{72D6C191-6891-4FF3-829D-63122C75BCB4}" type="datetimeFigureOut">
               <a:rPr lang="es-ES" smtClean="0"/>
-              <a:t>21/06/2012</a:t>
+              <a:pPr/>
+              <a:t>18/09/2012</a:t>
             </a:fld>
             <a:endParaRPr lang="es-ES"/>
           </a:p>
@@ -1341,6 +1352,7 @@
           <a:p>
             <a:fld id="{07125E69-B755-4441-B9CD-F24C22F498DD}" type="slidenum">
               <a:rPr lang="es-ES" smtClean="0"/>
+              <a:pPr/>
               <a:t>‹Nº›</a:t>
             </a:fld>
             <a:endParaRPr lang="es-ES"/>
@@ -1677,7 +1689,8 @@
           <a:p>
             <a:fld id="{72D6C191-6891-4FF3-829D-63122C75BCB4}" type="datetimeFigureOut">
               <a:rPr lang="es-ES" smtClean="0"/>
-              <a:t>21/06/2012</a:t>
+              <a:pPr/>
+              <a:t>18/09/2012</a:t>
             </a:fld>
             <a:endParaRPr lang="es-ES"/>
           </a:p>
@@ -1719,6 +1732,7 @@
           <a:p>
             <a:fld id="{07125E69-B755-4441-B9CD-F24C22F498DD}" type="slidenum">
               <a:rPr lang="es-ES" smtClean="0"/>
+              <a:pPr/>
               <a:t>‹Nº›</a:t>
             </a:fld>
             <a:endParaRPr lang="es-ES"/>
@@ -1827,7 +1841,8 @@
           <a:p>
             <a:fld id="{72D6C191-6891-4FF3-829D-63122C75BCB4}" type="datetimeFigureOut">
               <a:rPr lang="es-ES" smtClean="0"/>
-              <a:t>21/06/2012</a:t>
+              <a:pPr/>
+              <a:t>18/09/2012</a:t>
             </a:fld>
             <a:endParaRPr lang="es-ES"/>
           </a:p>
@@ -1869,6 +1884,7 @@
           <a:p>
             <a:fld id="{07125E69-B755-4441-B9CD-F24C22F498DD}" type="slidenum">
               <a:rPr lang="es-ES" smtClean="0"/>
+              <a:pPr/>
               <a:t>‹Nº›</a:t>
             </a:fld>
             <a:endParaRPr lang="es-ES"/>
@@ -1917,7 +1933,8 @@
           <a:p>
             <a:fld id="{72D6C191-6891-4FF3-829D-63122C75BCB4}" type="datetimeFigureOut">
               <a:rPr lang="es-ES" smtClean="0"/>
-              <a:t>21/06/2012</a:t>
+              <a:pPr/>
+              <a:t>18/09/2012</a:t>
             </a:fld>
             <a:endParaRPr lang="es-ES"/>
           </a:p>
@@ -1959,6 +1976,7 @@
           <a:p>
             <a:fld id="{07125E69-B755-4441-B9CD-F24C22F498DD}" type="slidenum">
               <a:rPr lang="es-ES" smtClean="0"/>
+              <a:pPr/>
               <a:t>‹Nº›</a:t>
             </a:fld>
             <a:endParaRPr lang="es-ES"/>
@@ -2178,7 +2196,8 @@
           <a:p>
             <a:fld id="{72D6C191-6891-4FF3-829D-63122C75BCB4}" type="datetimeFigureOut">
               <a:rPr lang="es-ES" smtClean="0"/>
-              <a:t>21/06/2012</a:t>
+              <a:pPr/>
+              <a:t>18/09/2012</a:t>
             </a:fld>
             <a:endParaRPr lang="es-ES"/>
           </a:p>
@@ -2220,6 +2239,7 @@
           <a:p>
             <a:fld id="{07125E69-B755-4441-B9CD-F24C22F498DD}" type="slidenum">
               <a:rPr lang="es-ES" smtClean="0"/>
+              <a:pPr/>
               <a:t>‹Nº›</a:t>
             </a:fld>
             <a:endParaRPr lang="es-ES"/>
@@ -2466,7 +2486,8 @@
           <a:p>
             <a:fld id="{72D6C191-6891-4FF3-829D-63122C75BCB4}" type="datetimeFigureOut">
               <a:rPr lang="es-ES" smtClean="0"/>
-              <a:t>21/06/2012</a:t>
+              <a:pPr/>
+              <a:t>18/09/2012</a:t>
             </a:fld>
             <a:endParaRPr lang="es-ES"/>
           </a:p>
@@ -2513,6 +2534,7 @@
           <a:p>
             <a:fld id="{07125E69-B755-4441-B9CD-F24C22F498DD}" type="slidenum">
               <a:rPr lang="es-ES" smtClean="0"/>
+              <a:pPr/>
               <a:t>‹Nº›</a:t>
             </a:fld>
             <a:endParaRPr lang="es-ES"/>
@@ -3237,7 +3259,8 @@
           <a:p>
             <a:fld id="{72D6C191-6891-4FF3-829D-63122C75BCB4}" type="datetimeFigureOut">
               <a:rPr lang="es-ES" smtClean="0"/>
-              <a:t>21/06/2012</a:t>
+              <a:pPr/>
+              <a:t>18/09/2012</a:t>
             </a:fld>
             <a:endParaRPr lang="es-ES"/>
           </a:p>
@@ -3315,6 +3338,7 @@
           <a:p>
             <a:fld id="{07125E69-B755-4441-B9CD-F24C22F498DD}" type="slidenum">
               <a:rPr lang="es-ES" smtClean="0"/>
+              <a:pPr/>
               <a:t>‹Nº›</a:t>
             </a:fld>
             <a:endParaRPr lang="es-ES"/>
@@ -12276,7 +12300,7 @@
               <a:tabLst/>
             </a:pPr>
             <a:r>
-              <a:rPr kumimoji="0" lang="en-US" sz="1000" b="0" i="0" u="none" strike="noStrike" cap="none" normalizeH="0" baseline="0" smtClean="0">
+              <a:rPr kumimoji="0" lang="en-US" sz="1000" b="0" i="0" u="none" strike="noStrike" cap="none" normalizeH="0" baseline="0" dirty="0" err="1" smtClean="0">
                 <a:ln>
                   <a:noFill/>
                 </a:ln>
@@ -12288,10 +12312,25 @@
                 <a:ea typeface="Calibri" pitchFamily="34" charset="0"/>
                 <a:cs typeface="Courier New" pitchFamily="49" charset="0"/>
               </a:rPr>
-              <a:t>BankProxy *proxy = </a:t>
-            </a:r>
-            <a:r>
-              <a:rPr kumimoji="0" lang="en-US" sz="1000" b="0" i="0" u="none" strike="noStrike" cap="none" normalizeH="0" baseline="0" smtClean="0">
+              <a:t>BankProxy</a:t>
+            </a:r>
+            <a:r>
+              <a:rPr kumimoji="0" lang="en-US" sz="1000" b="0" i="0" u="none" strike="noStrike" cap="none" normalizeH="0" baseline="0" dirty="0" smtClean="0">
+                <a:ln>
+                  <a:noFill/>
+                </a:ln>
+                <a:solidFill>
+                  <a:schemeClr val="tx1"/>
+                </a:solidFill>
+                <a:effectLst/>
+                <a:latin typeface="Courier New" pitchFamily="49" charset="0"/>
+                <a:ea typeface="Calibri" pitchFamily="34" charset="0"/>
+                <a:cs typeface="Courier New" pitchFamily="49" charset="0"/>
+              </a:rPr>
+              <a:t> *proxy = </a:t>
+            </a:r>
+            <a:r>
+              <a:rPr kumimoji="0" lang="en-US" sz="1000" b="0" i="0" u="none" strike="noStrike" cap="none" normalizeH="0" baseline="0" dirty="0" smtClean="0">
                 <a:ln>
                   <a:noFill/>
                 </a:ln>
@@ -12306,7 +12345,7 @@
               <a:t>new</a:t>
             </a:r>
             <a:r>
-              <a:rPr kumimoji="0" lang="en-US" sz="1000" b="0" i="0" u="none" strike="noStrike" cap="none" normalizeH="0" baseline="0" smtClean="0">
+              <a:rPr kumimoji="0" lang="en-US" sz="1000" b="0" i="0" u="none" strike="noStrike" cap="none" normalizeH="0" baseline="0" dirty="0" smtClean="0">
                 <a:ln>
                   <a:noFill/>
                 </a:ln>
@@ -12318,9 +12357,39 @@
                 <a:ea typeface="Calibri" pitchFamily="34" charset="0"/>
                 <a:cs typeface="Courier New" pitchFamily="49" charset="0"/>
               </a:rPr>
-              <a:t> BankProxy(0, 4000);    </a:t>
-            </a:r>
-            <a:endParaRPr kumimoji="0" lang="en-US" sz="800" b="0" i="0" u="none" strike="noStrike" cap="none" normalizeH="0" baseline="0" smtClean="0">
+              <a:t> </a:t>
+            </a:r>
+            <a:r>
+              <a:rPr kumimoji="0" lang="en-US" sz="1000" b="0" i="0" u="none" strike="noStrike" cap="none" normalizeH="0" baseline="0" dirty="0" err="1" smtClean="0">
+                <a:ln>
+                  <a:noFill/>
+                </a:ln>
+                <a:solidFill>
+                  <a:schemeClr val="tx1"/>
+                </a:solidFill>
+                <a:effectLst/>
+                <a:latin typeface="Courier New" pitchFamily="49" charset="0"/>
+                <a:ea typeface="Calibri" pitchFamily="34" charset="0"/>
+                <a:cs typeface="Courier New" pitchFamily="49" charset="0"/>
+              </a:rPr>
+              <a:t>BankProxy</a:t>
+            </a:r>
+            <a:r>
+              <a:rPr kumimoji="0" lang="en-US" sz="1000" b="0" i="0" u="none" strike="noStrike" cap="none" normalizeH="0" baseline="0" dirty="0" smtClean="0">
+                <a:ln>
+                  <a:noFill/>
+                </a:ln>
+                <a:solidFill>
+                  <a:schemeClr val="tx1"/>
+                </a:solidFill>
+                <a:effectLst/>
+                <a:latin typeface="Courier New" pitchFamily="49" charset="0"/>
+                <a:ea typeface="Calibri" pitchFamily="34" charset="0"/>
+                <a:cs typeface="Courier New" pitchFamily="49" charset="0"/>
+              </a:rPr>
+              <a:t>(0, 4000);    </a:t>
+            </a:r>
+            <a:endParaRPr kumimoji="0" lang="en-US" sz="800" b="0" i="0" u="none" strike="noStrike" cap="none" normalizeH="0" baseline="0" dirty="0" smtClean="0">
               <a:ln>
                 <a:noFill/>
               </a:ln>
@@ -12350,7 +12419,7 @@
               <a:tabLst/>
             </a:pPr>
             <a:r>
-              <a:rPr kumimoji="0" lang="en-US" sz="1000" b="0" i="0" u="none" strike="noStrike" cap="none" normalizeH="0" baseline="0" smtClean="0">
+              <a:rPr kumimoji="0" lang="en-US" sz="1000" b="0" i="0" u="none" strike="noStrike" cap="none" normalizeH="0" baseline="0" dirty="0" smtClean="0">
                 <a:ln>
                   <a:noFill/>
                 </a:ln>
@@ -12362,9 +12431,39 @@
                 <a:ea typeface="Calibri" pitchFamily="34" charset="0"/>
                 <a:cs typeface="Courier New" pitchFamily="49" charset="0"/>
               </a:rPr>
-              <a:t>Account *ac = AccountPluginSupport_create_data();    </a:t>
-            </a:r>
-            <a:endParaRPr kumimoji="0" lang="en-US" sz="800" b="0" i="0" u="none" strike="noStrike" cap="none" normalizeH="0" baseline="0" smtClean="0">
+              <a:t>Account *ac = </a:t>
+            </a:r>
+            <a:r>
+              <a:rPr kumimoji="0" lang="en-US" sz="1000" b="0" i="0" u="none" strike="noStrike" cap="none" normalizeH="0" baseline="0" dirty="0" err="1" smtClean="0">
+                <a:ln>
+                  <a:noFill/>
+                </a:ln>
+                <a:solidFill>
+                  <a:schemeClr val="tx1"/>
+                </a:solidFill>
+                <a:effectLst/>
+                <a:latin typeface="Courier New" pitchFamily="49" charset="0"/>
+                <a:ea typeface="Calibri" pitchFamily="34" charset="0"/>
+                <a:cs typeface="Courier New" pitchFamily="49" charset="0"/>
+              </a:rPr>
+              <a:t>AccountPluginSupport_create_data</a:t>
+            </a:r>
+            <a:r>
+              <a:rPr kumimoji="0" lang="en-US" sz="1000" b="0" i="0" u="none" strike="noStrike" cap="none" normalizeH="0" baseline="0" dirty="0" smtClean="0">
+                <a:ln>
+                  <a:noFill/>
+                </a:ln>
+                <a:solidFill>
+                  <a:schemeClr val="tx1"/>
+                </a:solidFill>
+                <a:effectLst/>
+                <a:latin typeface="Courier New" pitchFamily="49" charset="0"/>
+                <a:ea typeface="Calibri" pitchFamily="34" charset="0"/>
+                <a:cs typeface="Courier New" pitchFamily="49" charset="0"/>
+              </a:rPr>
+              <a:t>();    </a:t>
+            </a:r>
+            <a:endParaRPr kumimoji="0" lang="en-US" sz="800" b="0" i="0" u="none" strike="noStrike" cap="none" normalizeH="0" baseline="0" dirty="0" smtClean="0">
               <a:ln>
                 <a:noFill/>
               </a:ln>
@@ -12394,7 +12493,7 @@
               <a:tabLst/>
             </a:pPr>
             <a:r>
-              <a:rPr kumimoji="0" lang="en-US" sz="1000" b="0" i="0" u="none" strike="noStrike" cap="none" normalizeH="0" baseline="0" smtClean="0">
+              <a:rPr kumimoji="0" lang="en-US" sz="1000" b="0" i="0" u="none" strike="noStrike" cap="none" normalizeH="0" baseline="0" dirty="0" err="1" smtClean="0">
                 <a:ln>
                   <a:noFill/>
                 </a:ln>
@@ -12406,9 +12505,24 @@
                 <a:ea typeface="Calibri" pitchFamily="34" charset="0"/>
                 <a:cs typeface="Courier New" pitchFamily="49" charset="0"/>
               </a:rPr>
-              <a:t>DDS_Long  money ;       </a:t>
-            </a:r>
-            <a:endParaRPr kumimoji="0" lang="en-US" sz="800" b="0" i="0" u="none" strike="noStrike" cap="none" normalizeH="0" baseline="0" smtClean="0">
+              <a:t>DDS_Long</a:t>
+            </a:r>
+            <a:r>
+              <a:rPr kumimoji="0" lang="en-US" sz="1000" b="0" i="0" u="none" strike="noStrike" cap="none" normalizeH="0" baseline="0" dirty="0" smtClean="0">
+                <a:ln>
+                  <a:noFill/>
+                </a:ln>
+                <a:solidFill>
+                  <a:schemeClr val="tx1"/>
+                </a:solidFill>
+                <a:effectLst/>
+                <a:latin typeface="Courier New" pitchFamily="49" charset="0"/>
+                <a:ea typeface="Calibri" pitchFamily="34" charset="0"/>
+                <a:cs typeface="Courier New" pitchFamily="49" charset="0"/>
+              </a:rPr>
+              <a:t>  money ;       </a:t>
+            </a:r>
+            <a:endParaRPr kumimoji="0" lang="en-US" sz="800" b="0" i="0" u="none" strike="noStrike" cap="none" normalizeH="0" baseline="0" dirty="0" smtClean="0">
               <a:ln>
                 <a:noFill/>
               </a:ln>
@@ -12438,7 +12552,7 @@
               <a:tabLst/>
             </a:pPr>
             <a:r>
-              <a:rPr kumimoji="0" lang="en-US" sz="1000" b="0" i="0" u="none" strike="noStrike" cap="none" normalizeH="0" baseline="0" smtClean="0">
+              <a:rPr kumimoji="0" lang="en-US" sz="1000" b="0" i="0" u="none" strike="noStrike" cap="none" normalizeH="0" baseline="0" dirty="0" err="1" smtClean="0">
                 <a:ln>
                   <a:noFill/>
                 </a:ln>
@@ -12450,9 +12564,54 @@
                 <a:ea typeface="Calibri" pitchFamily="34" charset="0"/>
                 <a:cs typeface="Courier New" pitchFamily="49" charset="0"/>
               </a:rPr>
-              <a:t>ReturnCode  deposit_ret ;       </a:t>
-            </a:r>
-            <a:endParaRPr kumimoji="0" lang="en-US" sz="800" b="0" i="0" u="none" strike="noStrike" cap="none" normalizeH="0" baseline="0" smtClean="0">
+              <a:t>ReturnCode</a:t>
+            </a:r>
+            <a:r>
+              <a:rPr kumimoji="0" lang="en-US" sz="1000" b="0" i="0" u="none" strike="noStrike" cap="none" normalizeH="0" baseline="0" dirty="0" smtClean="0">
+                <a:ln>
+                  <a:noFill/>
+                </a:ln>
+                <a:solidFill>
+                  <a:schemeClr val="tx1"/>
+                </a:solidFill>
+                <a:effectLst/>
+                <a:latin typeface="Courier New" pitchFamily="49" charset="0"/>
+                <a:ea typeface="Calibri" pitchFamily="34" charset="0"/>
+                <a:cs typeface="Courier New" pitchFamily="49" charset="0"/>
+              </a:rPr>
+              <a:t>  </a:t>
+            </a:r>
+            <a:r>
+              <a:rPr kumimoji="0" lang="en-US" sz="1000" b="0" i="0" u="none" strike="noStrike" cap="none" normalizeH="0" baseline="0" dirty="0" err="1" smtClean="0">
+                <a:ln>
+                  <a:noFill/>
+                </a:ln>
+                <a:solidFill>
+                  <a:schemeClr val="tx1"/>
+                </a:solidFill>
+                <a:effectLst/>
+                <a:latin typeface="Courier New" pitchFamily="49" charset="0"/>
+                <a:ea typeface="Calibri" pitchFamily="34" charset="0"/>
+                <a:cs typeface="Courier New" pitchFamily="49" charset="0"/>
+              </a:rPr>
+              <a:t>deposit_ret</a:t>
+            </a:r>
+            <a:r>
+              <a:rPr kumimoji="0" lang="en-US" sz="1000" b="0" i="0" u="none" strike="noStrike" cap="none" normalizeH="0" baseline="0" dirty="0" smtClean="0">
+                <a:ln>
+                  <a:noFill/>
+                </a:ln>
+                <a:solidFill>
+                  <a:schemeClr val="tx1"/>
+                </a:solidFill>
+                <a:effectLst/>
+                <a:latin typeface="Courier New" pitchFamily="49" charset="0"/>
+                <a:ea typeface="Calibri" pitchFamily="34" charset="0"/>
+                <a:cs typeface="Courier New" pitchFamily="49" charset="0"/>
+              </a:rPr>
+              <a:t> ;       </a:t>
+            </a:r>
+            <a:endParaRPr kumimoji="0" lang="en-US" sz="800" b="0" i="0" u="none" strike="noStrike" cap="none" normalizeH="0" baseline="0" dirty="0" smtClean="0">
               <a:ln>
                 <a:noFill/>
               </a:ln>
@@ -12482,7 +12641,7 @@
               <a:tabLst/>
             </a:pPr>
             <a:r>
-              <a:rPr kumimoji="0" lang="en-US" sz="1000" b="0" i="0" u="none" strike="noStrike" cap="none" normalizeH="0" baseline="0" smtClean="0">
+              <a:rPr kumimoji="0" lang="en-US" sz="1000" b="0" i="0" u="none" strike="noStrike" cap="none" normalizeH="0" baseline="0" dirty="0" err="1" smtClean="0">
                 <a:ln>
                   <a:noFill/>
                 </a:ln>
@@ -12494,9 +12653,54 @@
                 <a:ea typeface="Calibri" pitchFamily="34" charset="0"/>
                 <a:cs typeface="Courier New" pitchFamily="49" charset="0"/>
               </a:rPr>
-              <a:t>DDSCSMessages  depositRetValue ;</a:t>
-            </a:r>
-            <a:endParaRPr kumimoji="0" lang="en-US" sz="800" b="0" i="0" u="none" strike="noStrike" cap="none" normalizeH="0" baseline="0" smtClean="0">
+              <a:t>DDSCSMessages</a:t>
+            </a:r>
+            <a:r>
+              <a:rPr kumimoji="0" lang="en-US" sz="1000" b="0" i="0" u="none" strike="noStrike" cap="none" normalizeH="0" baseline="0" dirty="0" smtClean="0">
+                <a:ln>
+                  <a:noFill/>
+                </a:ln>
+                <a:solidFill>
+                  <a:schemeClr val="tx1"/>
+                </a:solidFill>
+                <a:effectLst/>
+                <a:latin typeface="Courier New" pitchFamily="49" charset="0"/>
+                <a:ea typeface="Calibri" pitchFamily="34" charset="0"/>
+                <a:cs typeface="Courier New" pitchFamily="49" charset="0"/>
+              </a:rPr>
+              <a:t>  </a:t>
+            </a:r>
+            <a:r>
+              <a:rPr kumimoji="0" lang="en-US" sz="1000" b="0" i="0" u="none" strike="noStrike" cap="none" normalizeH="0" baseline="0" dirty="0" err="1" smtClean="0">
+                <a:ln>
+                  <a:noFill/>
+                </a:ln>
+                <a:solidFill>
+                  <a:schemeClr val="tx1"/>
+                </a:solidFill>
+                <a:effectLst/>
+                <a:latin typeface="Courier New" pitchFamily="49" charset="0"/>
+                <a:ea typeface="Calibri" pitchFamily="34" charset="0"/>
+                <a:cs typeface="Courier New" pitchFamily="49" charset="0"/>
+              </a:rPr>
+              <a:t>depositRetValue</a:t>
+            </a:r>
+            <a:r>
+              <a:rPr kumimoji="0" lang="en-US" sz="1000" b="0" i="0" u="none" strike="noStrike" cap="none" normalizeH="0" baseline="0" dirty="0" smtClean="0">
+                <a:ln>
+                  <a:noFill/>
+                </a:ln>
+                <a:solidFill>
+                  <a:schemeClr val="tx1"/>
+                </a:solidFill>
+                <a:effectLst/>
+                <a:latin typeface="Courier New" pitchFamily="49" charset="0"/>
+                <a:ea typeface="Calibri" pitchFamily="34" charset="0"/>
+                <a:cs typeface="Courier New" pitchFamily="49" charset="0"/>
+              </a:rPr>
+              <a:t> ;</a:t>
+            </a:r>
+            <a:endParaRPr kumimoji="0" lang="en-US" sz="800" b="0" i="0" u="none" strike="noStrike" cap="none" normalizeH="0" baseline="0" dirty="0" smtClean="0">
               <a:ln>
                 <a:noFill/>
               </a:ln>
@@ -12526,7 +12730,7 @@
               <a:tabLst/>
             </a:pPr>
             <a:r>
-              <a:rPr kumimoji="0" lang="en-US" sz="1000" b="0" i="0" u="none" strike="noStrike" cap="none" normalizeH="0" baseline="0" smtClean="0">
+              <a:rPr kumimoji="0" lang="en-US" sz="1000" b="0" i="0" u="none" strike="noStrike" cap="none" normalizeH="0" baseline="0" dirty="0" err="1" smtClean="0">
                 <a:ln>
                   <a:noFill/>
                 </a:ln>
@@ -12538,9 +12742,54 @@
                 <a:ea typeface="Calibri" pitchFamily="34" charset="0"/>
                 <a:cs typeface="Courier New" pitchFamily="49" charset="0"/>
               </a:rPr>
-              <a:t>depositRetValue = proxy-&gt;deposit(*ac, money, deposit_ret);</a:t>
-            </a:r>
-            <a:endParaRPr kumimoji="0" lang="en-US" sz="1800" b="0" i="0" u="none" strike="noStrike" cap="none" normalizeH="0" baseline="0" smtClean="0">
+              <a:t>depositRetValue</a:t>
+            </a:r>
+            <a:r>
+              <a:rPr kumimoji="0" lang="en-US" sz="1000" b="0" i="0" u="none" strike="noStrike" cap="none" normalizeH="0" baseline="0" dirty="0" smtClean="0">
+                <a:ln>
+                  <a:noFill/>
+                </a:ln>
+                <a:solidFill>
+                  <a:schemeClr val="tx1"/>
+                </a:solidFill>
+                <a:effectLst/>
+                <a:latin typeface="Courier New" pitchFamily="49" charset="0"/>
+                <a:ea typeface="Calibri" pitchFamily="34" charset="0"/>
+                <a:cs typeface="Courier New" pitchFamily="49" charset="0"/>
+              </a:rPr>
+              <a:t> = proxy-&gt;deposit(*ac, money, </a:t>
+            </a:r>
+            <a:r>
+              <a:rPr kumimoji="0" lang="en-US" sz="1000" b="0" i="0" u="none" strike="noStrike" cap="none" normalizeH="0" baseline="0" dirty="0" err="1" smtClean="0">
+                <a:ln>
+                  <a:noFill/>
+                </a:ln>
+                <a:solidFill>
+                  <a:schemeClr val="tx1"/>
+                </a:solidFill>
+                <a:effectLst/>
+                <a:latin typeface="Courier New" pitchFamily="49" charset="0"/>
+                <a:ea typeface="Calibri" pitchFamily="34" charset="0"/>
+                <a:cs typeface="Courier New" pitchFamily="49" charset="0"/>
+              </a:rPr>
+              <a:t>deposit_ret</a:t>
+            </a:r>
+            <a:r>
+              <a:rPr kumimoji="0" lang="en-US" sz="1000" b="0" i="0" u="none" strike="noStrike" cap="none" normalizeH="0" baseline="0" dirty="0" smtClean="0">
+                <a:ln>
+                  <a:noFill/>
+                </a:ln>
+                <a:solidFill>
+                  <a:schemeClr val="tx1"/>
+                </a:solidFill>
+                <a:effectLst/>
+                <a:latin typeface="Courier New" pitchFamily="49" charset="0"/>
+                <a:ea typeface="Calibri" pitchFamily="34" charset="0"/>
+                <a:cs typeface="Courier New" pitchFamily="49" charset="0"/>
+              </a:rPr>
+              <a:t>);</a:t>
+            </a:r>
+            <a:endParaRPr kumimoji="0" lang="en-US" sz="1800" b="0" i="0" u="none" strike="noStrike" cap="none" normalizeH="0" baseline="0" dirty="0" smtClean="0">
               <a:ln>
                 <a:noFill/>
               </a:ln>
@@ -13552,7 +13801,7 @@
               <a:tabLst/>
             </a:pPr>
             <a:r>
-              <a:rPr kumimoji="0" lang="en-US" sz="1000" b="0" i="0" u="none" strike="noStrike" cap="none" normalizeH="0" baseline="0" smtClean="0">
+              <a:rPr kumimoji="0" lang="en-US" sz="1000" b="0" i="0" u="none" strike="noStrike" cap="none" normalizeH="0" baseline="0" dirty="0" err="1" smtClean="0">
                 <a:ln>
                   <a:noFill/>
                 </a:ln>
@@ -13564,10 +13813,25 @@
                 <a:ea typeface="Calibri" pitchFamily="34" charset="0"/>
                 <a:cs typeface="Courier New" pitchFamily="49" charset="0"/>
               </a:rPr>
-              <a:t>BankServer *server = </a:t>
-            </a:r>
-            <a:r>
-              <a:rPr kumimoji="0" lang="en-US" sz="1000" b="0" i="0" u="none" strike="noStrike" cap="none" normalizeH="0" baseline="0" smtClean="0">
+              <a:t>BankServer</a:t>
+            </a:r>
+            <a:r>
+              <a:rPr kumimoji="0" lang="en-US" sz="1000" b="0" i="0" u="none" strike="noStrike" cap="none" normalizeH="0" baseline="0" dirty="0" smtClean="0">
+                <a:ln>
+                  <a:noFill/>
+                </a:ln>
+                <a:solidFill>
+                  <a:schemeClr val="tx1"/>
+                </a:solidFill>
+                <a:effectLst/>
+                <a:latin typeface="Courier New" pitchFamily="49" charset="0"/>
+                <a:ea typeface="Calibri" pitchFamily="34" charset="0"/>
+                <a:cs typeface="Courier New" pitchFamily="49" charset="0"/>
+              </a:rPr>
+              <a:t> *server = </a:t>
+            </a:r>
+            <a:r>
+              <a:rPr kumimoji="0" lang="en-US" sz="1000" b="0" i="0" u="none" strike="noStrike" cap="none" normalizeH="0" baseline="0" dirty="0" smtClean="0">
                 <a:ln>
                   <a:noFill/>
                 </a:ln>
@@ -13582,7 +13846,7 @@
               <a:t>new</a:t>
             </a:r>
             <a:r>
-              <a:rPr kumimoji="0" lang="en-US" sz="1000" b="0" i="0" u="none" strike="noStrike" cap="none" normalizeH="0" baseline="0" smtClean="0">
+              <a:rPr kumimoji="0" lang="en-US" sz="1000" b="0" i="0" u="none" strike="noStrike" cap="none" normalizeH="0" baseline="0" dirty="0" smtClean="0">
                 <a:ln>
                   <a:noFill/>
                 </a:ln>
@@ -13594,9 +13858,39 @@
                 <a:ea typeface="Calibri" pitchFamily="34" charset="0"/>
                 <a:cs typeface="Courier New" pitchFamily="49" charset="0"/>
               </a:rPr>
-              <a:t> BankServer(0, 5);</a:t>
-            </a:r>
-            <a:endParaRPr kumimoji="0" lang="en-US" sz="800" b="0" i="0" u="none" strike="noStrike" cap="none" normalizeH="0" baseline="0" smtClean="0">
+              <a:t> </a:t>
+            </a:r>
+            <a:r>
+              <a:rPr kumimoji="0" lang="en-US" sz="1000" b="0" i="0" u="none" strike="noStrike" cap="none" normalizeH="0" baseline="0" dirty="0" err="1" smtClean="0">
+                <a:ln>
+                  <a:noFill/>
+                </a:ln>
+                <a:solidFill>
+                  <a:schemeClr val="tx1"/>
+                </a:solidFill>
+                <a:effectLst/>
+                <a:latin typeface="Courier New" pitchFamily="49" charset="0"/>
+                <a:ea typeface="Calibri" pitchFamily="34" charset="0"/>
+                <a:cs typeface="Courier New" pitchFamily="49" charset="0"/>
+              </a:rPr>
+              <a:t>BankServer</a:t>
+            </a:r>
+            <a:r>
+              <a:rPr kumimoji="0" lang="en-US" sz="1000" b="0" i="0" u="none" strike="noStrike" cap="none" normalizeH="0" baseline="0" dirty="0" smtClean="0">
+                <a:ln>
+                  <a:noFill/>
+                </a:ln>
+                <a:solidFill>
+                  <a:schemeClr val="tx1"/>
+                </a:solidFill>
+                <a:effectLst/>
+                <a:latin typeface="Courier New" pitchFamily="49" charset="0"/>
+                <a:ea typeface="Calibri" pitchFamily="34" charset="0"/>
+                <a:cs typeface="Courier New" pitchFamily="49" charset="0"/>
+              </a:rPr>
+              <a:t>(0, 5);</a:t>
+            </a:r>
+            <a:endParaRPr kumimoji="0" lang="en-US" sz="800" b="0" i="0" u="none" strike="noStrike" cap="none" normalizeH="0" baseline="0" dirty="0" smtClean="0">
               <a:ln>
                 <a:noFill/>
               </a:ln>
@@ -13626,7 +13920,7 @@
               <a:tabLst/>
             </a:pPr>
             <a:r>
-              <a:rPr kumimoji="0" lang="es-ES" sz="1000" b="0" i="0" u="none" strike="noStrike" cap="none" normalizeH="0" baseline="0" smtClean="0">
+              <a:rPr kumimoji="0" lang="es-ES" sz="1000" b="0" i="0" u="none" strike="noStrike" cap="none" normalizeH="0" baseline="0" dirty="0" smtClean="0">
                 <a:ln>
                   <a:noFill/>
                 </a:ln>
@@ -13638,9 +13932,39 @@
                 <a:ea typeface="Calibri" pitchFamily="34" charset="0"/>
                 <a:cs typeface="Courier New" pitchFamily="49" charset="0"/>
               </a:rPr>
-              <a:t>server-&gt;executeServer();</a:t>
-            </a:r>
-            <a:endParaRPr kumimoji="0" lang="es-ES" sz="1800" b="0" i="0" u="none" strike="noStrike" cap="none" normalizeH="0" baseline="0" smtClean="0">
+              <a:t>server-&gt;</a:t>
+            </a:r>
+            <a:r>
+              <a:rPr kumimoji="0" lang="es-ES" sz="1000" b="0" i="0" u="none" strike="noStrike" cap="none" normalizeH="0" baseline="0" dirty="0" err="1" smtClean="0">
+                <a:ln>
+                  <a:noFill/>
+                </a:ln>
+                <a:solidFill>
+                  <a:schemeClr val="tx1"/>
+                </a:solidFill>
+                <a:effectLst/>
+                <a:latin typeface="Courier New" pitchFamily="49" charset="0"/>
+                <a:ea typeface="Calibri" pitchFamily="34" charset="0"/>
+                <a:cs typeface="Courier New" pitchFamily="49" charset="0"/>
+              </a:rPr>
+              <a:t>wait</a:t>
+            </a:r>
+            <a:r>
+              <a:rPr kumimoji="0" lang="es-ES" sz="1000" b="0" i="0" u="none" strike="noStrike" cap="none" normalizeH="0" baseline="0" dirty="0" smtClean="0">
+                <a:ln>
+                  <a:noFill/>
+                </a:ln>
+                <a:solidFill>
+                  <a:schemeClr val="tx1"/>
+                </a:solidFill>
+                <a:effectLst/>
+                <a:latin typeface="Courier New" pitchFamily="49" charset="0"/>
+                <a:ea typeface="Calibri" pitchFamily="34" charset="0"/>
+                <a:cs typeface="Courier New" pitchFamily="49" charset="0"/>
+              </a:rPr>
+              <a:t>();</a:t>
+            </a:r>
+            <a:endParaRPr kumimoji="0" lang="es-ES" sz="1800" b="0" i="0" u="none" strike="noStrike" cap="none" normalizeH="0" baseline="0" dirty="0" smtClean="0">
               <a:ln>
                 <a:noFill/>
               </a:ln>
@@ -13696,7 +14020,7 @@
           <a:p>
             <a:r>
               <a:rPr lang="es-ES" dirty="0" err="1" smtClean="0"/>
-              <a:t>QoS</a:t>
+              <a:t>Features</a:t>
             </a:r>
             <a:endParaRPr lang="es-ES" dirty="0"/>
           </a:p>
@@ -13704,2288 +14028,195 @@
       </p:sp>
       <p:sp>
         <p:nvSpPr>
-          <p:cNvPr id="22530" name="Rectangle 2"/>
+          <p:cNvPr id="3" name="2 Marcador de contenido"/>
           <p:cNvSpPr>
-            <a:spLocks noChangeArrowheads="1"/>
+            <a:spLocks noGrp="1"/>
           </p:cNvSpPr>
-          <p:nvPr/>
+          <p:nvPr>
+            <p:ph idx="1"/>
+          </p:nvPr>
         </p:nvSpPr>
-        <p:spPr bwMode="auto">
-          <a:xfrm>
-            <a:off x="0" y="0"/>
-            <a:ext cx="9144000" cy="0"/>
-          </a:xfrm>
-          <a:prstGeom prst="rect">
-            <a:avLst/>
-          </a:prstGeom>
-          <a:noFill/>
-          <a:ln w="9525">
-            <a:noFill/>
-            <a:miter lim="800000"/>
-            <a:headEnd/>
-            <a:tailEnd/>
-          </a:ln>
-          <a:effectLst/>
-        </p:spPr>
+        <p:spPr/>
         <p:txBody>
-          <a:bodyPr vert="horz" wrap="none" lIns="91440" tIns="45720" rIns="91440" bIns="45720" numCol="1" anchor="ctr" anchorCtr="0" compatLnSpc="1">
-            <a:prstTxWarp prst="textNoShape">
-              <a:avLst/>
-            </a:prstTxWarp>
-            <a:spAutoFit/>
-          </a:bodyPr>
+          <a:bodyPr/>
           <a:lstStyle/>
           <a:p>
-            <a:endParaRPr lang="es-ES"/>
-          </a:p>
-        </p:txBody>
-      </p:sp>
-      <p:sp>
-        <p:nvSpPr>
-          <p:cNvPr id="22529" name="Rectangle 1"/>
-          <p:cNvSpPr>
-            <a:spLocks noChangeArrowheads="1"/>
-          </p:cNvSpPr>
-          <p:nvPr/>
-        </p:nvSpPr>
-        <p:spPr bwMode="auto">
-          <a:xfrm>
-            <a:off x="1547664" y="3501008"/>
-            <a:ext cx="5472608" cy="3095625"/>
-          </a:xfrm>
-          <a:prstGeom prst="rect">
-            <a:avLst/>
-          </a:prstGeom>
-          <a:gradFill rotWithShape="0">
-            <a:gsLst>
-              <a:gs pos="0">
-                <a:srgbClr val="95B3D7"/>
-              </a:gs>
-              <a:gs pos="50000">
-                <a:srgbClr val="DBE5F1"/>
-              </a:gs>
-              <a:gs pos="100000">
-                <a:srgbClr val="95B3D7"/>
-              </a:gs>
-            </a:gsLst>
-            <a:lin ang="18900000" scaled="1"/>
-          </a:gradFill>
-          <a:ln w="12700">
-            <a:solidFill>
-              <a:srgbClr val="95B3D7"/>
-            </a:solidFill>
-            <a:miter lim="800000"/>
-            <a:headEnd/>
-            <a:tailEnd/>
-          </a:ln>
-          <a:effectLst>
-            <a:outerShdw dist="28398" dir="3806097" algn="ctr" rotWithShape="0">
-              <a:srgbClr val="243F60">
-                <a:alpha val="50000"/>
-              </a:srgbClr>
-            </a:outerShdw>
-          </a:effectLst>
-        </p:spPr>
-        <p:txBody>
-          <a:bodyPr vert="horz" wrap="square" lIns="91440" tIns="45720" rIns="91440" bIns="45720" numCol="1" anchor="t" anchorCtr="0" compatLnSpc="1">
-            <a:prstTxWarp prst="textNoShape">
-              <a:avLst/>
-            </a:prstTxWarp>
-          </a:bodyPr>
-          <a:lstStyle/>
-          <a:p>
-            <a:pPr marL="0" marR="0" lvl="0" indent="0" algn="l" defTabSz="914400" rtl="0" eaLnBrk="1" fontAlgn="base" latinLnBrk="0" hangingPunct="1">
-              <a:lnSpc>
-                <a:spcPct val="100000"/>
-              </a:lnSpc>
-              <a:spcBef>
-                <a:spcPct val="0"/>
-              </a:spcBef>
-              <a:spcAft>
-                <a:spcPct val="0"/>
-              </a:spcAft>
-              <a:buClrTx/>
-              <a:buSzTx/>
-              <a:buFontTx/>
-              <a:buNone/>
-              <a:tabLst/>
-            </a:pPr>
-            <a:r>
-              <a:rPr kumimoji="0" lang="en-US" sz="1000" b="0" i="0" u="none" strike="noStrike" cap="none" normalizeH="0" baseline="0" dirty="0" smtClean="0">
-                <a:ln>
-                  <a:noFill/>
-                </a:ln>
-                <a:solidFill>
-                  <a:srgbClr val="0000FF"/>
-                </a:solidFill>
-                <a:effectLst/>
-                <a:latin typeface="Courier New" pitchFamily="49" charset="0"/>
-                <a:ea typeface="Calibri" pitchFamily="34" charset="0"/>
-                <a:cs typeface="Courier New" pitchFamily="49" charset="0"/>
-              </a:rPr>
-              <a:t>&lt;</a:t>
-            </a:r>
-            <a:r>
-              <a:rPr kumimoji="0" lang="en-US" sz="1000" b="0" i="0" u="none" strike="noStrike" cap="none" normalizeH="0" baseline="0" dirty="0" err="1" smtClean="0">
-                <a:ln>
-                  <a:noFill/>
-                </a:ln>
-                <a:solidFill>
-                  <a:srgbClr val="A31515"/>
-                </a:solidFill>
-                <a:effectLst/>
-                <a:latin typeface="Courier New" pitchFamily="49" charset="0"/>
-                <a:ea typeface="Calibri" pitchFamily="34" charset="0"/>
-                <a:cs typeface="Courier New" pitchFamily="49" charset="0"/>
-              </a:rPr>
-              <a:t>qos_profile</a:t>
-            </a:r>
-            <a:r>
-              <a:rPr kumimoji="0" lang="en-US" sz="1000" b="0" i="0" u="none" strike="noStrike" cap="none" normalizeH="0" baseline="0" dirty="0" smtClean="0">
-                <a:ln>
-                  <a:noFill/>
-                </a:ln>
-                <a:solidFill>
-                  <a:srgbClr val="0000FF"/>
-                </a:solidFill>
-                <a:effectLst/>
-                <a:latin typeface="Courier New" pitchFamily="49" charset="0"/>
-                <a:ea typeface="Calibri" pitchFamily="34" charset="0"/>
-                <a:cs typeface="Courier New" pitchFamily="49" charset="0"/>
-              </a:rPr>
+            <a:r>
+              <a:rPr lang="es-ES" dirty="0" err="1" smtClean="0"/>
+              <a:t>Offer</a:t>
+            </a:r>
+            <a:r>
+              <a:rPr lang="es-ES" dirty="0" smtClean="0"/>
               <a:t> </a:t>
             </a:r>
             <a:r>
-              <a:rPr kumimoji="0" lang="en-US" sz="1000" b="0" i="0" u="none" strike="noStrike" cap="none" normalizeH="0" baseline="0" dirty="0" smtClean="0">
-                <a:ln>
-                  <a:noFill/>
-                </a:ln>
-                <a:solidFill>
-                  <a:srgbClr val="FF0000"/>
-                </a:solidFill>
-                <a:effectLst/>
-                <a:latin typeface="Courier New" pitchFamily="49" charset="0"/>
-                <a:ea typeface="Calibri" pitchFamily="34" charset="0"/>
-                <a:cs typeface="Courier New" pitchFamily="49" charset="0"/>
-              </a:rPr>
-              <a:t>name</a:t>
-            </a:r>
-            <a:r>
-              <a:rPr kumimoji="0" lang="en-US" sz="1000" b="0" i="0" u="none" strike="noStrike" cap="none" normalizeH="0" baseline="0" dirty="0" smtClean="0">
-                <a:ln>
-                  <a:noFill/>
-                </a:ln>
-                <a:solidFill>
-                  <a:srgbClr val="0000FF"/>
-                </a:solidFill>
-                <a:effectLst/>
-                <a:latin typeface="Courier New" pitchFamily="49" charset="0"/>
-                <a:ea typeface="Calibri" pitchFamily="34" charset="0"/>
-                <a:cs typeface="Courier New" pitchFamily="49" charset="0"/>
-              </a:rPr>
-              <a:t>=</a:t>
-            </a:r>
-            <a:r>
-              <a:rPr kumimoji="0" lang="en-US" sz="1000" b="0" i="0" u="none" strike="noStrike" cap="none" normalizeH="0" baseline="0" dirty="0" smtClean="0">
-                <a:ln>
-                  <a:noFill/>
-                </a:ln>
-                <a:solidFill>
-                  <a:schemeClr val="tx1"/>
-                </a:solidFill>
-                <a:effectLst/>
-                <a:latin typeface="Courier New" pitchFamily="49" charset="0"/>
-                <a:ea typeface="Calibri" pitchFamily="34" charset="0"/>
-                <a:cs typeface="Courier New" pitchFamily="49" charset="0"/>
-              </a:rPr>
-              <a:t>"</a:t>
-            </a:r>
-            <a:r>
-              <a:rPr kumimoji="0" lang="en-US" sz="1000" b="0" i="0" u="none" strike="noStrike" cap="none" normalizeH="0" baseline="0" dirty="0" err="1" smtClean="0">
-                <a:ln>
-                  <a:noFill/>
-                </a:ln>
-                <a:solidFill>
-                  <a:srgbClr val="0000FF"/>
-                </a:solidFill>
-                <a:effectLst/>
-                <a:latin typeface="Courier New" pitchFamily="49" charset="0"/>
-                <a:ea typeface="Calibri" pitchFamily="34" charset="0"/>
-                <a:cs typeface="Courier New" pitchFamily="49" charset="0"/>
-              </a:rPr>
-              <a:t>DefaultQoS_Profile</a:t>
-            </a:r>
-            <a:r>
-              <a:rPr kumimoji="0" lang="en-US" sz="1000" b="0" i="0" u="none" strike="noStrike" cap="none" normalizeH="0" baseline="0" dirty="0" smtClean="0">
-                <a:ln>
-                  <a:noFill/>
-                </a:ln>
-                <a:solidFill>
-                  <a:schemeClr val="tx1"/>
-                </a:solidFill>
-                <a:effectLst/>
-                <a:latin typeface="Courier New" pitchFamily="49" charset="0"/>
-                <a:ea typeface="Calibri" pitchFamily="34" charset="0"/>
-                <a:cs typeface="Courier New" pitchFamily="49" charset="0"/>
-              </a:rPr>
-              <a:t>"</a:t>
-            </a:r>
-            <a:r>
-              <a:rPr kumimoji="0" lang="en-US" sz="1000" b="0" i="0" u="none" strike="noStrike" cap="none" normalizeH="0" baseline="0" dirty="0" smtClean="0">
-                <a:ln>
-                  <a:noFill/>
-                </a:ln>
-                <a:solidFill>
-                  <a:srgbClr val="0000FF"/>
-                </a:solidFill>
-                <a:effectLst/>
-                <a:latin typeface="Courier New" pitchFamily="49" charset="0"/>
-                <a:ea typeface="Calibri" pitchFamily="34" charset="0"/>
-                <a:cs typeface="Courier New" pitchFamily="49" charset="0"/>
-              </a:rPr>
-              <a:t>&gt;</a:t>
-            </a:r>
-            <a:endParaRPr kumimoji="0" lang="en-US" sz="800" b="0" i="0" u="none" strike="noStrike" cap="none" normalizeH="0" baseline="0" dirty="0" smtClean="0">
-              <a:ln>
-                <a:noFill/>
-              </a:ln>
-              <a:solidFill>
-                <a:schemeClr val="tx1"/>
-              </a:solidFill>
-              <a:effectLst/>
-              <a:latin typeface="Arial" pitchFamily="34" charset="0"/>
-              <a:cs typeface="Arial" pitchFamily="34" charset="0"/>
-            </a:endParaRPr>
-          </a:p>
-          <a:p>
-            <a:pPr marL="0" marR="0" lvl="0" indent="0" algn="l" defTabSz="914400" rtl="0" eaLnBrk="0" fontAlgn="base" latinLnBrk="0" hangingPunct="0">
-              <a:lnSpc>
-                <a:spcPct val="100000"/>
-              </a:lnSpc>
-              <a:spcBef>
-                <a:spcPct val="0"/>
-              </a:spcBef>
-              <a:spcAft>
-                <a:spcPct val="0"/>
-              </a:spcAft>
-              <a:buClrTx/>
-              <a:buSzTx/>
-              <a:buFontTx/>
-              <a:buNone/>
-              <a:tabLst/>
-            </a:pPr>
-            <a:r>
-              <a:rPr kumimoji="0" lang="en-US" sz="1000" b="0" i="0" u="none" strike="noStrike" cap="none" normalizeH="0" baseline="0" dirty="0" smtClean="0">
-                <a:ln>
-                  <a:noFill/>
-                </a:ln>
-                <a:solidFill>
-                  <a:srgbClr val="0000FF"/>
-                </a:solidFill>
-                <a:effectLst/>
-                <a:latin typeface="Courier New" pitchFamily="49" charset="0"/>
-                <a:ea typeface="Calibri" pitchFamily="34" charset="0"/>
-                <a:cs typeface="Courier New" pitchFamily="49" charset="0"/>
-              </a:rPr>
-              <a:t>    &lt;</a:t>
-            </a:r>
-            <a:r>
-              <a:rPr kumimoji="0" lang="en-US" sz="1000" b="0" i="0" u="none" strike="noStrike" cap="none" normalizeH="0" baseline="0" dirty="0" err="1" smtClean="0">
-                <a:ln>
-                  <a:noFill/>
-                </a:ln>
-                <a:solidFill>
-                  <a:srgbClr val="A31515"/>
-                </a:solidFill>
-                <a:effectLst/>
-                <a:latin typeface="Courier New" pitchFamily="49" charset="0"/>
-                <a:ea typeface="Calibri" pitchFamily="34" charset="0"/>
-                <a:cs typeface="Courier New" pitchFamily="49" charset="0"/>
-              </a:rPr>
-              <a:t>datawriter_qos</a:t>
-            </a:r>
-            <a:r>
-              <a:rPr kumimoji="0" lang="en-US" sz="1000" b="0" i="0" u="none" strike="noStrike" cap="none" normalizeH="0" baseline="0" dirty="0" smtClean="0">
-                <a:ln>
-                  <a:noFill/>
-                </a:ln>
-                <a:solidFill>
-                  <a:srgbClr val="0000FF"/>
-                </a:solidFill>
-                <a:effectLst/>
-                <a:latin typeface="Courier New" pitchFamily="49" charset="0"/>
-                <a:ea typeface="Calibri" pitchFamily="34" charset="0"/>
-                <a:cs typeface="Courier New" pitchFamily="49" charset="0"/>
-              </a:rPr>
-              <a:t>&gt;</a:t>
-            </a:r>
-            <a:endParaRPr kumimoji="0" lang="en-US" sz="800" b="0" i="0" u="none" strike="noStrike" cap="none" normalizeH="0" baseline="0" dirty="0" smtClean="0">
-              <a:ln>
-                <a:noFill/>
-              </a:ln>
-              <a:solidFill>
-                <a:schemeClr val="tx1"/>
-              </a:solidFill>
-              <a:effectLst/>
-              <a:latin typeface="Arial" pitchFamily="34" charset="0"/>
-              <a:cs typeface="Arial" pitchFamily="34" charset="0"/>
-            </a:endParaRPr>
-          </a:p>
-          <a:p>
-            <a:pPr marL="0" marR="0" lvl="0" indent="0" algn="l" defTabSz="914400" rtl="0" eaLnBrk="0" fontAlgn="base" latinLnBrk="0" hangingPunct="0">
-              <a:lnSpc>
-                <a:spcPct val="100000"/>
-              </a:lnSpc>
-              <a:spcBef>
-                <a:spcPct val="0"/>
-              </a:spcBef>
-              <a:spcAft>
-                <a:spcPct val="0"/>
-              </a:spcAft>
-              <a:buClrTx/>
-              <a:buSzTx/>
-              <a:buFontTx/>
-              <a:buNone/>
-              <a:tabLst/>
-            </a:pPr>
-            <a:r>
-              <a:rPr kumimoji="0" lang="en-US" sz="1000" b="0" i="0" u="none" strike="noStrike" cap="none" normalizeH="0" baseline="0" dirty="0" smtClean="0">
-                <a:ln>
-                  <a:noFill/>
-                </a:ln>
-                <a:solidFill>
-                  <a:srgbClr val="0000FF"/>
-                </a:solidFill>
-                <a:effectLst/>
-                <a:latin typeface="Courier New" pitchFamily="49" charset="0"/>
-                <a:ea typeface="Calibri" pitchFamily="34" charset="0"/>
-                <a:cs typeface="Courier New" pitchFamily="49" charset="0"/>
-              </a:rPr>
-              <a:t>        &lt;</a:t>
-            </a:r>
-            <a:r>
-              <a:rPr kumimoji="0" lang="en-US" sz="1000" b="0" i="0" u="none" strike="noStrike" cap="none" normalizeH="0" baseline="0" dirty="0" smtClean="0">
-                <a:ln>
-                  <a:noFill/>
-                </a:ln>
-                <a:solidFill>
-                  <a:srgbClr val="A31515"/>
-                </a:solidFill>
-                <a:effectLst/>
-                <a:latin typeface="Courier New" pitchFamily="49" charset="0"/>
-                <a:ea typeface="Calibri" pitchFamily="34" charset="0"/>
-                <a:cs typeface="Courier New" pitchFamily="49" charset="0"/>
-              </a:rPr>
-              <a:t>reliability</a:t>
-            </a:r>
-            <a:r>
-              <a:rPr kumimoji="0" lang="en-US" sz="1000" b="0" i="0" u="none" strike="noStrike" cap="none" normalizeH="0" baseline="0" dirty="0" smtClean="0">
-                <a:ln>
-                  <a:noFill/>
-                </a:ln>
-                <a:solidFill>
-                  <a:srgbClr val="0000FF"/>
-                </a:solidFill>
-                <a:effectLst/>
-                <a:latin typeface="Courier New" pitchFamily="49" charset="0"/>
-                <a:ea typeface="Calibri" pitchFamily="34" charset="0"/>
-                <a:cs typeface="Courier New" pitchFamily="49" charset="0"/>
-              </a:rPr>
-              <a:t>&gt;</a:t>
-            </a:r>
-            <a:endParaRPr kumimoji="0" lang="en-US" sz="800" b="0" i="0" u="none" strike="noStrike" cap="none" normalizeH="0" baseline="0" dirty="0" smtClean="0">
-              <a:ln>
-                <a:noFill/>
-              </a:ln>
-              <a:solidFill>
-                <a:schemeClr val="tx1"/>
-              </a:solidFill>
-              <a:effectLst/>
-              <a:latin typeface="Arial" pitchFamily="34" charset="0"/>
-              <a:cs typeface="Arial" pitchFamily="34" charset="0"/>
-            </a:endParaRPr>
-          </a:p>
-          <a:p>
-            <a:pPr marL="0" marR="0" lvl="0" indent="0" algn="l" defTabSz="914400" rtl="0" eaLnBrk="0" fontAlgn="base" latinLnBrk="0" hangingPunct="0">
-              <a:lnSpc>
-                <a:spcPct val="100000"/>
-              </a:lnSpc>
-              <a:spcBef>
-                <a:spcPct val="0"/>
-              </a:spcBef>
-              <a:spcAft>
-                <a:spcPct val="0"/>
-              </a:spcAft>
-              <a:buClrTx/>
-              <a:buSzTx/>
-              <a:buFontTx/>
-              <a:buNone/>
-              <a:tabLst/>
-            </a:pPr>
-            <a:r>
-              <a:rPr kumimoji="0" lang="en-US" sz="1000" b="0" i="0" u="none" strike="noStrike" cap="none" normalizeH="0" baseline="0" dirty="0" smtClean="0">
-                <a:ln>
-                  <a:noFill/>
-                </a:ln>
-                <a:solidFill>
-                  <a:srgbClr val="0000FF"/>
-                </a:solidFill>
-                <a:effectLst/>
-                <a:latin typeface="Courier New" pitchFamily="49" charset="0"/>
-                <a:ea typeface="Calibri" pitchFamily="34" charset="0"/>
-                <a:cs typeface="Courier New" pitchFamily="49" charset="0"/>
-              </a:rPr>
-              <a:t>            &lt;</a:t>
-            </a:r>
-            <a:r>
-              <a:rPr kumimoji="0" lang="en-US" sz="1000" b="0" i="0" u="none" strike="noStrike" cap="none" normalizeH="0" baseline="0" dirty="0" smtClean="0">
-                <a:ln>
-                  <a:noFill/>
-                </a:ln>
-                <a:solidFill>
-                  <a:srgbClr val="A31515"/>
-                </a:solidFill>
-                <a:effectLst/>
-                <a:latin typeface="Courier New" pitchFamily="49" charset="0"/>
-                <a:ea typeface="Calibri" pitchFamily="34" charset="0"/>
-                <a:cs typeface="Courier New" pitchFamily="49" charset="0"/>
-              </a:rPr>
-              <a:t>kind</a:t>
-            </a:r>
-            <a:r>
-              <a:rPr kumimoji="0" lang="en-US" sz="1000" b="0" i="0" u="none" strike="noStrike" cap="none" normalizeH="0" baseline="0" dirty="0" smtClean="0">
-                <a:ln>
-                  <a:noFill/>
-                </a:ln>
-                <a:solidFill>
-                  <a:srgbClr val="0000FF"/>
-                </a:solidFill>
-                <a:effectLst/>
-                <a:latin typeface="Courier New" pitchFamily="49" charset="0"/>
-                <a:ea typeface="Calibri" pitchFamily="34" charset="0"/>
-                <a:cs typeface="Courier New" pitchFamily="49" charset="0"/>
-              </a:rPr>
-              <a:t>&gt;</a:t>
-            </a:r>
-            <a:r>
-              <a:rPr kumimoji="0" lang="en-US" sz="1000" b="0" i="0" u="none" strike="noStrike" cap="none" normalizeH="0" baseline="0" dirty="0" smtClean="0">
-                <a:ln>
-                  <a:noFill/>
-                </a:ln>
-                <a:solidFill>
-                  <a:schemeClr val="tx1"/>
-                </a:solidFill>
-                <a:effectLst/>
-                <a:latin typeface="Courier New" pitchFamily="49" charset="0"/>
-                <a:ea typeface="Calibri" pitchFamily="34" charset="0"/>
-                <a:cs typeface="Courier New" pitchFamily="49" charset="0"/>
-              </a:rPr>
-              <a:t>RELIABLE_RELIABILITY_QOS</a:t>
-            </a:r>
-            <a:r>
-              <a:rPr kumimoji="0" lang="en-US" sz="1000" b="0" i="0" u="none" strike="noStrike" cap="none" normalizeH="0" baseline="0" dirty="0" smtClean="0">
-                <a:ln>
-                  <a:noFill/>
-                </a:ln>
-                <a:solidFill>
-                  <a:srgbClr val="0000FF"/>
-                </a:solidFill>
-                <a:effectLst/>
-                <a:latin typeface="Courier New" pitchFamily="49" charset="0"/>
-                <a:ea typeface="Calibri" pitchFamily="34" charset="0"/>
-                <a:cs typeface="Courier New" pitchFamily="49" charset="0"/>
-              </a:rPr>
-              <a:t>&lt;/</a:t>
-            </a:r>
-            <a:r>
-              <a:rPr kumimoji="0" lang="en-US" sz="1000" b="0" i="0" u="none" strike="noStrike" cap="none" normalizeH="0" baseline="0" dirty="0" smtClean="0">
-                <a:ln>
-                  <a:noFill/>
-                </a:ln>
-                <a:solidFill>
-                  <a:srgbClr val="A31515"/>
-                </a:solidFill>
-                <a:effectLst/>
-                <a:latin typeface="Courier New" pitchFamily="49" charset="0"/>
-                <a:ea typeface="Calibri" pitchFamily="34" charset="0"/>
-                <a:cs typeface="Courier New" pitchFamily="49" charset="0"/>
-              </a:rPr>
-              <a:t>kind</a:t>
-            </a:r>
-            <a:r>
-              <a:rPr kumimoji="0" lang="en-US" sz="1000" b="0" i="0" u="none" strike="noStrike" cap="none" normalizeH="0" baseline="0" dirty="0" smtClean="0">
-                <a:ln>
-                  <a:noFill/>
-                </a:ln>
-                <a:solidFill>
-                  <a:srgbClr val="0000FF"/>
-                </a:solidFill>
-                <a:effectLst/>
-                <a:latin typeface="Courier New" pitchFamily="49" charset="0"/>
-                <a:ea typeface="Calibri" pitchFamily="34" charset="0"/>
-                <a:cs typeface="Courier New" pitchFamily="49" charset="0"/>
-              </a:rPr>
-              <a:t>&gt;</a:t>
-            </a:r>
-            <a:endParaRPr kumimoji="0" lang="en-US" sz="800" b="0" i="0" u="none" strike="noStrike" cap="none" normalizeH="0" baseline="0" dirty="0" smtClean="0">
-              <a:ln>
-                <a:noFill/>
-              </a:ln>
-              <a:solidFill>
-                <a:schemeClr val="tx1"/>
-              </a:solidFill>
-              <a:effectLst/>
-              <a:latin typeface="Arial" pitchFamily="34" charset="0"/>
-              <a:cs typeface="Arial" pitchFamily="34" charset="0"/>
-            </a:endParaRPr>
-          </a:p>
-          <a:p>
-            <a:pPr marL="0" marR="0" lvl="0" indent="0" algn="l" defTabSz="914400" rtl="0" eaLnBrk="0" fontAlgn="base" latinLnBrk="0" hangingPunct="0">
-              <a:lnSpc>
-                <a:spcPct val="100000"/>
-              </a:lnSpc>
-              <a:spcBef>
-                <a:spcPct val="0"/>
-              </a:spcBef>
-              <a:spcAft>
-                <a:spcPct val="0"/>
-              </a:spcAft>
-              <a:buClrTx/>
-              <a:buSzTx/>
-              <a:buFontTx/>
-              <a:buNone/>
-              <a:tabLst/>
-            </a:pPr>
-            <a:r>
-              <a:rPr kumimoji="0" lang="en-US" sz="1000" b="0" i="0" u="none" strike="noStrike" cap="none" normalizeH="0" baseline="0" dirty="0" smtClean="0">
-                <a:ln>
-                  <a:noFill/>
-                </a:ln>
-                <a:solidFill>
-                  <a:srgbClr val="0000FF"/>
-                </a:solidFill>
-                <a:effectLst/>
-                <a:latin typeface="Courier New" pitchFamily="49" charset="0"/>
-                <a:ea typeface="Calibri" pitchFamily="34" charset="0"/>
-                <a:cs typeface="Courier New" pitchFamily="49" charset="0"/>
-              </a:rPr>
-              <a:t>        &lt;/</a:t>
-            </a:r>
-            <a:r>
-              <a:rPr kumimoji="0" lang="en-US" sz="1000" b="0" i="0" u="none" strike="noStrike" cap="none" normalizeH="0" baseline="0" dirty="0" smtClean="0">
-                <a:ln>
-                  <a:noFill/>
-                </a:ln>
-                <a:solidFill>
-                  <a:srgbClr val="A31515"/>
-                </a:solidFill>
-                <a:effectLst/>
-                <a:latin typeface="Courier New" pitchFamily="49" charset="0"/>
-                <a:ea typeface="Calibri" pitchFamily="34" charset="0"/>
-                <a:cs typeface="Courier New" pitchFamily="49" charset="0"/>
-              </a:rPr>
-              <a:t>reliability</a:t>
-            </a:r>
-            <a:r>
-              <a:rPr kumimoji="0" lang="en-US" sz="1000" b="0" i="0" u="none" strike="noStrike" cap="none" normalizeH="0" baseline="0" dirty="0" smtClean="0">
-                <a:ln>
-                  <a:noFill/>
-                </a:ln>
-                <a:solidFill>
-                  <a:srgbClr val="0000FF"/>
-                </a:solidFill>
-                <a:effectLst/>
-                <a:latin typeface="Courier New" pitchFamily="49" charset="0"/>
-                <a:ea typeface="Calibri" pitchFamily="34" charset="0"/>
-                <a:cs typeface="Courier New" pitchFamily="49" charset="0"/>
-              </a:rPr>
-              <a:t>&gt;                </a:t>
-            </a:r>
-            <a:endParaRPr kumimoji="0" lang="en-US" sz="800" b="0" i="0" u="none" strike="noStrike" cap="none" normalizeH="0" baseline="0" dirty="0" smtClean="0">
-              <a:ln>
-                <a:noFill/>
-              </a:ln>
-              <a:solidFill>
-                <a:schemeClr val="tx1"/>
-              </a:solidFill>
-              <a:effectLst/>
-              <a:latin typeface="Arial" pitchFamily="34" charset="0"/>
-              <a:cs typeface="Arial" pitchFamily="34" charset="0"/>
-            </a:endParaRPr>
-          </a:p>
-          <a:p>
-            <a:pPr marL="0" marR="0" lvl="0" indent="0" algn="l" defTabSz="914400" rtl="0" eaLnBrk="0" fontAlgn="base" latinLnBrk="0" hangingPunct="0">
-              <a:lnSpc>
-                <a:spcPct val="100000"/>
-              </a:lnSpc>
-              <a:spcBef>
-                <a:spcPct val="0"/>
-              </a:spcBef>
-              <a:spcAft>
-                <a:spcPct val="0"/>
-              </a:spcAft>
-              <a:buClrTx/>
-              <a:buSzTx/>
-              <a:buFontTx/>
-              <a:buNone/>
-              <a:tabLst/>
-            </a:pPr>
-            <a:r>
-              <a:rPr kumimoji="0" lang="en-US" sz="1000" b="0" i="0" u="none" strike="noStrike" cap="none" normalizeH="0" baseline="0" dirty="0" smtClean="0">
-                <a:ln>
-                  <a:noFill/>
-                </a:ln>
-                <a:solidFill>
-                  <a:srgbClr val="0000FF"/>
-                </a:solidFill>
-                <a:effectLst/>
-                <a:latin typeface="Courier New" pitchFamily="49" charset="0"/>
-                <a:ea typeface="Calibri" pitchFamily="34" charset="0"/>
-                <a:cs typeface="Courier New" pitchFamily="49" charset="0"/>
-              </a:rPr>
-              <a:t>        &lt;</a:t>
-            </a:r>
-            <a:r>
-              <a:rPr kumimoji="0" lang="en-US" sz="1000" b="0" i="0" u="none" strike="noStrike" cap="none" normalizeH="0" baseline="0" dirty="0" smtClean="0">
-                <a:ln>
-                  <a:noFill/>
-                </a:ln>
-                <a:solidFill>
-                  <a:srgbClr val="A31515"/>
-                </a:solidFill>
-                <a:effectLst/>
-                <a:latin typeface="Courier New" pitchFamily="49" charset="0"/>
-                <a:ea typeface="Calibri" pitchFamily="34" charset="0"/>
-                <a:cs typeface="Courier New" pitchFamily="49" charset="0"/>
-              </a:rPr>
-              <a:t>history</a:t>
-            </a:r>
-            <a:r>
-              <a:rPr kumimoji="0" lang="en-US" sz="1000" b="0" i="0" u="none" strike="noStrike" cap="none" normalizeH="0" baseline="0" dirty="0" smtClean="0">
-                <a:ln>
-                  <a:noFill/>
-                </a:ln>
-                <a:solidFill>
-                  <a:srgbClr val="0000FF"/>
-                </a:solidFill>
-                <a:effectLst/>
-                <a:latin typeface="Courier New" pitchFamily="49" charset="0"/>
-                <a:ea typeface="Calibri" pitchFamily="34" charset="0"/>
-                <a:cs typeface="Courier New" pitchFamily="49" charset="0"/>
-              </a:rPr>
-              <a:t>&gt;</a:t>
-            </a:r>
-            <a:endParaRPr kumimoji="0" lang="en-US" sz="800" b="0" i="0" u="none" strike="noStrike" cap="none" normalizeH="0" baseline="0" dirty="0" smtClean="0">
-              <a:ln>
-                <a:noFill/>
-              </a:ln>
-              <a:solidFill>
-                <a:schemeClr val="tx1"/>
-              </a:solidFill>
-              <a:effectLst/>
-              <a:latin typeface="Arial" pitchFamily="34" charset="0"/>
-              <a:cs typeface="Arial" pitchFamily="34" charset="0"/>
-            </a:endParaRPr>
-          </a:p>
-          <a:p>
-            <a:pPr marL="0" marR="0" lvl="0" indent="0" algn="l" defTabSz="914400" rtl="0" eaLnBrk="0" fontAlgn="base" latinLnBrk="0" hangingPunct="0">
-              <a:lnSpc>
-                <a:spcPct val="100000"/>
-              </a:lnSpc>
-              <a:spcBef>
-                <a:spcPct val="0"/>
-              </a:spcBef>
-              <a:spcAft>
-                <a:spcPct val="0"/>
-              </a:spcAft>
-              <a:buClrTx/>
-              <a:buSzTx/>
-              <a:buFontTx/>
-              <a:buNone/>
-              <a:tabLst/>
-            </a:pPr>
-            <a:r>
-              <a:rPr kumimoji="0" lang="en-US" sz="1000" b="0" i="0" u="none" strike="noStrike" cap="none" normalizeH="0" baseline="0" dirty="0" smtClean="0">
-                <a:ln>
-                  <a:noFill/>
-                </a:ln>
-                <a:solidFill>
-                  <a:srgbClr val="0000FF"/>
-                </a:solidFill>
-                <a:effectLst/>
-                <a:latin typeface="Courier New" pitchFamily="49" charset="0"/>
-                <a:ea typeface="Calibri" pitchFamily="34" charset="0"/>
-                <a:cs typeface="Courier New" pitchFamily="49" charset="0"/>
-              </a:rPr>
-              <a:t>            &lt;</a:t>
-            </a:r>
-            <a:r>
-              <a:rPr kumimoji="0" lang="en-US" sz="1000" b="0" i="0" u="none" strike="noStrike" cap="none" normalizeH="0" baseline="0" dirty="0" smtClean="0">
-                <a:ln>
-                  <a:noFill/>
-                </a:ln>
-                <a:solidFill>
-                  <a:srgbClr val="A31515"/>
-                </a:solidFill>
-                <a:effectLst/>
-                <a:latin typeface="Courier New" pitchFamily="49" charset="0"/>
-                <a:ea typeface="Calibri" pitchFamily="34" charset="0"/>
-                <a:cs typeface="Courier New" pitchFamily="49" charset="0"/>
-              </a:rPr>
-              <a:t>kind</a:t>
-            </a:r>
-            <a:r>
-              <a:rPr kumimoji="0" lang="en-US" sz="1000" b="0" i="0" u="none" strike="noStrike" cap="none" normalizeH="0" baseline="0" dirty="0" smtClean="0">
-                <a:ln>
-                  <a:noFill/>
-                </a:ln>
-                <a:solidFill>
-                  <a:srgbClr val="0000FF"/>
-                </a:solidFill>
-                <a:effectLst/>
-                <a:latin typeface="Courier New" pitchFamily="49" charset="0"/>
-                <a:ea typeface="Calibri" pitchFamily="34" charset="0"/>
-                <a:cs typeface="Courier New" pitchFamily="49" charset="0"/>
-              </a:rPr>
-              <a:t>&gt;</a:t>
-            </a:r>
-            <a:r>
-              <a:rPr kumimoji="0" lang="en-US" sz="1000" b="0" i="0" u="none" strike="noStrike" cap="none" normalizeH="0" baseline="0" dirty="0" smtClean="0">
-                <a:ln>
-                  <a:noFill/>
-                </a:ln>
-                <a:solidFill>
-                  <a:schemeClr val="tx1"/>
-                </a:solidFill>
-                <a:effectLst/>
-                <a:latin typeface="Courier New" pitchFamily="49" charset="0"/>
-                <a:ea typeface="Calibri" pitchFamily="34" charset="0"/>
-                <a:cs typeface="Courier New" pitchFamily="49" charset="0"/>
-              </a:rPr>
-              <a:t>KEEP_ALL_HISTORY_QOS</a:t>
-            </a:r>
-            <a:r>
-              <a:rPr kumimoji="0" lang="en-US" sz="1000" b="0" i="0" u="none" strike="noStrike" cap="none" normalizeH="0" baseline="0" dirty="0" smtClean="0">
-                <a:ln>
-                  <a:noFill/>
-                </a:ln>
-                <a:solidFill>
-                  <a:srgbClr val="0000FF"/>
-                </a:solidFill>
-                <a:effectLst/>
-                <a:latin typeface="Courier New" pitchFamily="49" charset="0"/>
-                <a:ea typeface="Calibri" pitchFamily="34" charset="0"/>
-                <a:cs typeface="Courier New" pitchFamily="49" charset="0"/>
-              </a:rPr>
-              <a:t>&lt;/</a:t>
-            </a:r>
-            <a:r>
-              <a:rPr kumimoji="0" lang="en-US" sz="1000" b="0" i="0" u="none" strike="noStrike" cap="none" normalizeH="0" baseline="0" dirty="0" smtClean="0">
-                <a:ln>
-                  <a:noFill/>
-                </a:ln>
-                <a:solidFill>
-                  <a:srgbClr val="A31515"/>
-                </a:solidFill>
-                <a:effectLst/>
-                <a:latin typeface="Courier New" pitchFamily="49" charset="0"/>
-                <a:ea typeface="Calibri" pitchFamily="34" charset="0"/>
-                <a:cs typeface="Courier New" pitchFamily="49" charset="0"/>
-              </a:rPr>
-              <a:t>kind</a:t>
-            </a:r>
-            <a:r>
-              <a:rPr kumimoji="0" lang="en-US" sz="1000" b="0" i="0" u="none" strike="noStrike" cap="none" normalizeH="0" baseline="0" dirty="0" smtClean="0">
-                <a:ln>
-                  <a:noFill/>
-                </a:ln>
-                <a:solidFill>
-                  <a:srgbClr val="0000FF"/>
-                </a:solidFill>
-                <a:effectLst/>
-                <a:latin typeface="Courier New" pitchFamily="49" charset="0"/>
-                <a:ea typeface="Calibri" pitchFamily="34" charset="0"/>
-                <a:cs typeface="Courier New" pitchFamily="49" charset="0"/>
-              </a:rPr>
-              <a:t>&gt;</a:t>
-            </a:r>
-            <a:endParaRPr kumimoji="0" lang="en-US" sz="800" b="0" i="0" u="none" strike="noStrike" cap="none" normalizeH="0" baseline="0" dirty="0" smtClean="0">
-              <a:ln>
-                <a:noFill/>
-              </a:ln>
-              <a:solidFill>
-                <a:schemeClr val="tx1"/>
-              </a:solidFill>
-              <a:effectLst/>
-              <a:latin typeface="Arial" pitchFamily="34" charset="0"/>
-              <a:cs typeface="Arial" pitchFamily="34" charset="0"/>
-            </a:endParaRPr>
-          </a:p>
-          <a:p>
-            <a:pPr marL="0" marR="0" lvl="0" indent="0" algn="l" defTabSz="914400" rtl="0" eaLnBrk="0" fontAlgn="base" latinLnBrk="0" hangingPunct="0">
-              <a:lnSpc>
-                <a:spcPct val="100000"/>
-              </a:lnSpc>
-              <a:spcBef>
-                <a:spcPct val="0"/>
-              </a:spcBef>
-              <a:spcAft>
-                <a:spcPct val="0"/>
-              </a:spcAft>
-              <a:buClrTx/>
-              <a:buSzTx/>
-              <a:buFontTx/>
-              <a:buNone/>
-              <a:tabLst/>
-            </a:pPr>
-            <a:r>
-              <a:rPr kumimoji="0" lang="en-US" sz="1000" b="0" i="0" u="none" strike="noStrike" cap="none" normalizeH="0" baseline="0" dirty="0" smtClean="0">
-                <a:ln>
-                  <a:noFill/>
-                </a:ln>
-                <a:solidFill>
-                  <a:srgbClr val="0000FF"/>
-                </a:solidFill>
-                <a:effectLst/>
-                <a:latin typeface="Courier New" pitchFamily="49" charset="0"/>
-                <a:ea typeface="Calibri" pitchFamily="34" charset="0"/>
-                <a:cs typeface="Courier New" pitchFamily="49" charset="0"/>
-              </a:rPr>
-              <a:t>        &lt;/</a:t>
-            </a:r>
-            <a:r>
-              <a:rPr kumimoji="0" lang="en-US" sz="1000" b="0" i="0" u="none" strike="noStrike" cap="none" normalizeH="0" baseline="0" dirty="0" smtClean="0">
-                <a:ln>
-                  <a:noFill/>
-                </a:ln>
-                <a:solidFill>
-                  <a:srgbClr val="A31515"/>
-                </a:solidFill>
-                <a:effectLst/>
-                <a:latin typeface="Courier New" pitchFamily="49" charset="0"/>
-                <a:ea typeface="Calibri" pitchFamily="34" charset="0"/>
-                <a:cs typeface="Courier New" pitchFamily="49" charset="0"/>
-              </a:rPr>
-              <a:t>history</a:t>
-            </a:r>
-            <a:r>
-              <a:rPr kumimoji="0" lang="en-US" sz="1000" b="0" i="0" u="none" strike="noStrike" cap="none" normalizeH="0" baseline="0" dirty="0" smtClean="0">
-                <a:ln>
-                  <a:noFill/>
-                </a:ln>
-                <a:solidFill>
-                  <a:srgbClr val="0000FF"/>
-                </a:solidFill>
-                <a:effectLst/>
-                <a:latin typeface="Courier New" pitchFamily="49" charset="0"/>
-                <a:ea typeface="Calibri" pitchFamily="34" charset="0"/>
-                <a:cs typeface="Courier New" pitchFamily="49" charset="0"/>
-              </a:rPr>
-              <a:t>&gt;		</a:t>
-            </a:r>
-            <a:endParaRPr kumimoji="0" lang="en-US" sz="800" b="0" i="0" u="none" strike="noStrike" cap="none" normalizeH="0" baseline="0" dirty="0" smtClean="0">
-              <a:ln>
-                <a:noFill/>
-              </a:ln>
-              <a:solidFill>
-                <a:schemeClr val="tx1"/>
-              </a:solidFill>
-              <a:effectLst/>
-              <a:latin typeface="Arial" pitchFamily="34" charset="0"/>
-              <a:cs typeface="Arial" pitchFamily="34" charset="0"/>
-            </a:endParaRPr>
-          </a:p>
-          <a:p>
-            <a:pPr marL="0" marR="0" lvl="0" indent="0" algn="l" defTabSz="914400" rtl="0" eaLnBrk="0" fontAlgn="base" latinLnBrk="0" hangingPunct="0">
-              <a:lnSpc>
-                <a:spcPct val="100000"/>
-              </a:lnSpc>
-              <a:spcBef>
-                <a:spcPct val="0"/>
-              </a:spcBef>
-              <a:spcAft>
-                <a:spcPct val="0"/>
-              </a:spcAft>
-              <a:buClrTx/>
-              <a:buSzTx/>
-              <a:buFontTx/>
-              <a:buNone/>
-              <a:tabLst/>
-            </a:pPr>
-            <a:r>
-              <a:rPr kumimoji="0" lang="en-US" sz="1000" b="0" i="0" u="none" strike="noStrike" cap="none" normalizeH="0" baseline="0" dirty="0" smtClean="0">
-                <a:ln>
-                  <a:noFill/>
-                </a:ln>
-                <a:solidFill>
-                  <a:srgbClr val="0000FF"/>
-                </a:solidFill>
-                <a:effectLst/>
-                <a:latin typeface="Courier New" pitchFamily="49" charset="0"/>
-                <a:ea typeface="Calibri" pitchFamily="34" charset="0"/>
-                <a:cs typeface="Courier New" pitchFamily="49" charset="0"/>
-              </a:rPr>
-              <a:t>    &lt;/</a:t>
-            </a:r>
-            <a:r>
-              <a:rPr kumimoji="0" lang="en-US" sz="1000" b="0" i="0" u="none" strike="noStrike" cap="none" normalizeH="0" baseline="0" dirty="0" err="1" smtClean="0">
-                <a:ln>
-                  <a:noFill/>
-                </a:ln>
-                <a:solidFill>
-                  <a:srgbClr val="A31515"/>
-                </a:solidFill>
-                <a:effectLst/>
-                <a:latin typeface="Courier New" pitchFamily="49" charset="0"/>
-                <a:ea typeface="Calibri" pitchFamily="34" charset="0"/>
-                <a:cs typeface="Courier New" pitchFamily="49" charset="0"/>
-              </a:rPr>
-              <a:t>datawriter_qos</a:t>
-            </a:r>
-            <a:r>
-              <a:rPr kumimoji="0" lang="en-US" sz="1000" b="0" i="0" u="none" strike="noStrike" cap="none" normalizeH="0" baseline="0" dirty="0" smtClean="0">
-                <a:ln>
-                  <a:noFill/>
-                </a:ln>
-                <a:solidFill>
-                  <a:srgbClr val="0000FF"/>
-                </a:solidFill>
-                <a:effectLst/>
-                <a:latin typeface="Courier New" pitchFamily="49" charset="0"/>
-                <a:ea typeface="Calibri" pitchFamily="34" charset="0"/>
-                <a:cs typeface="Courier New" pitchFamily="49" charset="0"/>
-              </a:rPr>
-              <a:t>&gt;</a:t>
-            </a:r>
-            <a:endParaRPr kumimoji="0" lang="en-US" sz="800" b="0" i="0" u="none" strike="noStrike" cap="none" normalizeH="0" baseline="0" dirty="0" smtClean="0">
-              <a:ln>
-                <a:noFill/>
-              </a:ln>
-              <a:solidFill>
-                <a:schemeClr val="tx1"/>
-              </a:solidFill>
-              <a:effectLst/>
-              <a:latin typeface="Arial" pitchFamily="34" charset="0"/>
-              <a:cs typeface="Arial" pitchFamily="34" charset="0"/>
-            </a:endParaRPr>
-          </a:p>
-          <a:p>
-            <a:pPr marL="0" marR="0" lvl="0" indent="0" algn="l" defTabSz="914400" rtl="0" eaLnBrk="0" fontAlgn="base" latinLnBrk="0" hangingPunct="0">
-              <a:lnSpc>
-                <a:spcPct val="100000"/>
-              </a:lnSpc>
-              <a:spcBef>
-                <a:spcPct val="0"/>
-              </a:spcBef>
-              <a:spcAft>
-                <a:spcPct val="0"/>
-              </a:spcAft>
-              <a:buClrTx/>
-              <a:buSzTx/>
-              <a:buFontTx/>
-              <a:buNone/>
-              <a:tabLst/>
-            </a:pPr>
-            <a:r>
-              <a:rPr kumimoji="0" lang="en-US" sz="1000" b="0" i="0" u="none" strike="noStrike" cap="none" normalizeH="0" baseline="0" dirty="0" smtClean="0">
-                <a:ln>
-                  <a:noFill/>
-                </a:ln>
-                <a:solidFill>
-                  <a:srgbClr val="0000FF"/>
-                </a:solidFill>
-                <a:effectLst/>
-                <a:latin typeface="Courier New" pitchFamily="49" charset="0"/>
-                <a:ea typeface="Calibri" pitchFamily="34" charset="0"/>
-                <a:cs typeface="Courier New" pitchFamily="49" charset="0"/>
-              </a:rPr>
-              <a:t>    &lt;</a:t>
-            </a:r>
-            <a:r>
-              <a:rPr kumimoji="0" lang="en-US" sz="1000" b="0" i="0" u="none" strike="noStrike" cap="none" normalizeH="0" baseline="0" dirty="0" err="1" smtClean="0">
-                <a:ln>
-                  <a:noFill/>
-                </a:ln>
-                <a:solidFill>
-                  <a:srgbClr val="A31515"/>
-                </a:solidFill>
-                <a:effectLst/>
-                <a:latin typeface="Courier New" pitchFamily="49" charset="0"/>
-                <a:ea typeface="Calibri" pitchFamily="34" charset="0"/>
-                <a:cs typeface="Courier New" pitchFamily="49" charset="0"/>
-              </a:rPr>
-              <a:t>datareader_qos</a:t>
-            </a:r>
-            <a:r>
-              <a:rPr kumimoji="0" lang="en-US" sz="1000" b="0" i="0" u="none" strike="noStrike" cap="none" normalizeH="0" baseline="0" dirty="0" smtClean="0">
-                <a:ln>
-                  <a:noFill/>
-                </a:ln>
-                <a:solidFill>
-                  <a:srgbClr val="0000FF"/>
-                </a:solidFill>
-                <a:effectLst/>
-                <a:latin typeface="Courier New" pitchFamily="49" charset="0"/>
-                <a:ea typeface="Calibri" pitchFamily="34" charset="0"/>
-                <a:cs typeface="Courier New" pitchFamily="49" charset="0"/>
-              </a:rPr>
-              <a:t>&gt;</a:t>
-            </a:r>
-            <a:endParaRPr kumimoji="0" lang="en-US" sz="800" b="0" i="0" u="none" strike="noStrike" cap="none" normalizeH="0" baseline="0" dirty="0" smtClean="0">
-              <a:ln>
-                <a:noFill/>
-              </a:ln>
-              <a:solidFill>
-                <a:schemeClr val="tx1"/>
-              </a:solidFill>
-              <a:effectLst/>
-              <a:latin typeface="Arial" pitchFamily="34" charset="0"/>
-              <a:cs typeface="Arial" pitchFamily="34" charset="0"/>
-            </a:endParaRPr>
-          </a:p>
-          <a:p>
-            <a:pPr marL="0" marR="0" lvl="0" indent="0" algn="l" defTabSz="914400" rtl="0" eaLnBrk="0" fontAlgn="base" latinLnBrk="0" hangingPunct="0">
-              <a:lnSpc>
-                <a:spcPct val="100000"/>
-              </a:lnSpc>
-              <a:spcBef>
-                <a:spcPct val="0"/>
-              </a:spcBef>
-              <a:spcAft>
-                <a:spcPct val="0"/>
-              </a:spcAft>
-              <a:buClrTx/>
-              <a:buSzTx/>
-              <a:buFontTx/>
-              <a:buNone/>
-              <a:tabLst/>
-            </a:pPr>
-            <a:r>
-              <a:rPr kumimoji="0" lang="en-US" sz="1000" b="0" i="0" u="none" strike="noStrike" cap="none" normalizeH="0" baseline="0" dirty="0" smtClean="0">
-                <a:ln>
-                  <a:noFill/>
-                </a:ln>
-                <a:solidFill>
-                  <a:srgbClr val="0000FF"/>
-                </a:solidFill>
-                <a:effectLst/>
-                <a:latin typeface="Courier New" pitchFamily="49" charset="0"/>
-                <a:ea typeface="Calibri" pitchFamily="34" charset="0"/>
-                <a:cs typeface="Courier New" pitchFamily="49" charset="0"/>
-              </a:rPr>
-              <a:t>        &lt;</a:t>
-            </a:r>
-            <a:r>
-              <a:rPr kumimoji="0" lang="en-US" sz="1000" b="0" i="0" u="none" strike="noStrike" cap="none" normalizeH="0" baseline="0" dirty="0" smtClean="0">
-                <a:ln>
-                  <a:noFill/>
-                </a:ln>
-                <a:solidFill>
-                  <a:srgbClr val="A31515"/>
-                </a:solidFill>
-                <a:effectLst/>
-                <a:latin typeface="Courier New" pitchFamily="49" charset="0"/>
-                <a:ea typeface="Calibri" pitchFamily="34" charset="0"/>
-                <a:cs typeface="Courier New" pitchFamily="49" charset="0"/>
-              </a:rPr>
-              <a:t>reliability</a:t>
-            </a:r>
-            <a:r>
-              <a:rPr kumimoji="0" lang="en-US" sz="1000" b="0" i="0" u="none" strike="noStrike" cap="none" normalizeH="0" baseline="0" dirty="0" smtClean="0">
-                <a:ln>
-                  <a:noFill/>
-                </a:ln>
-                <a:solidFill>
-                  <a:srgbClr val="0000FF"/>
-                </a:solidFill>
-                <a:effectLst/>
-                <a:latin typeface="Courier New" pitchFamily="49" charset="0"/>
-                <a:ea typeface="Calibri" pitchFamily="34" charset="0"/>
-                <a:cs typeface="Courier New" pitchFamily="49" charset="0"/>
-              </a:rPr>
-              <a:t>&gt;</a:t>
-            </a:r>
-            <a:endParaRPr kumimoji="0" lang="en-US" sz="800" b="0" i="0" u="none" strike="noStrike" cap="none" normalizeH="0" baseline="0" dirty="0" smtClean="0">
-              <a:ln>
-                <a:noFill/>
-              </a:ln>
-              <a:solidFill>
-                <a:schemeClr val="tx1"/>
-              </a:solidFill>
-              <a:effectLst/>
-              <a:latin typeface="Arial" pitchFamily="34" charset="0"/>
-              <a:cs typeface="Arial" pitchFamily="34" charset="0"/>
-            </a:endParaRPr>
-          </a:p>
-          <a:p>
-            <a:pPr marL="0" marR="0" lvl="0" indent="0" algn="l" defTabSz="914400" rtl="0" eaLnBrk="0" fontAlgn="base" latinLnBrk="0" hangingPunct="0">
-              <a:lnSpc>
-                <a:spcPct val="100000"/>
-              </a:lnSpc>
-              <a:spcBef>
-                <a:spcPct val="0"/>
-              </a:spcBef>
-              <a:spcAft>
-                <a:spcPct val="0"/>
-              </a:spcAft>
-              <a:buClrTx/>
-              <a:buSzTx/>
-              <a:buFontTx/>
-              <a:buNone/>
-              <a:tabLst/>
-            </a:pPr>
-            <a:r>
-              <a:rPr kumimoji="0" lang="en-US" sz="1000" b="0" i="0" u="none" strike="noStrike" cap="none" normalizeH="0" baseline="0" dirty="0" smtClean="0">
-                <a:ln>
-                  <a:noFill/>
-                </a:ln>
-                <a:solidFill>
-                  <a:srgbClr val="0000FF"/>
-                </a:solidFill>
-                <a:effectLst/>
-                <a:latin typeface="Courier New" pitchFamily="49" charset="0"/>
-                <a:ea typeface="Calibri" pitchFamily="34" charset="0"/>
-                <a:cs typeface="Courier New" pitchFamily="49" charset="0"/>
-              </a:rPr>
-              <a:t>            &lt;</a:t>
-            </a:r>
-            <a:r>
-              <a:rPr kumimoji="0" lang="en-US" sz="1000" b="0" i="0" u="none" strike="noStrike" cap="none" normalizeH="0" baseline="0" dirty="0" smtClean="0">
-                <a:ln>
-                  <a:noFill/>
-                </a:ln>
-                <a:solidFill>
-                  <a:srgbClr val="A31515"/>
-                </a:solidFill>
-                <a:effectLst/>
-                <a:latin typeface="Courier New" pitchFamily="49" charset="0"/>
-                <a:ea typeface="Calibri" pitchFamily="34" charset="0"/>
-                <a:cs typeface="Courier New" pitchFamily="49" charset="0"/>
-              </a:rPr>
-              <a:t>kind</a:t>
-            </a:r>
-            <a:r>
-              <a:rPr kumimoji="0" lang="en-US" sz="1000" b="0" i="0" u="none" strike="noStrike" cap="none" normalizeH="0" baseline="0" dirty="0" smtClean="0">
-                <a:ln>
-                  <a:noFill/>
-                </a:ln>
-                <a:solidFill>
-                  <a:srgbClr val="0000FF"/>
-                </a:solidFill>
-                <a:effectLst/>
-                <a:latin typeface="Courier New" pitchFamily="49" charset="0"/>
-                <a:ea typeface="Calibri" pitchFamily="34" charset="0"/>
-                <a:cs typeface="Courier New" pitchFamily="49" charset="0"/>
-              </a:rPr>
-              <a:t>&gt;</a:t>
-            </a:r>
-            <a:r>
-              <a:rPr kumimoji="0" lang="en-US" sz="1000" b="0" i="0" u="none" strike="noStrike" cap="none" normalizeH="0" baseline="0" dirty="0" smtClean="0">
-                <a:ln>
-                  <a:noFill/>
-                </a:ln>
-                <a:solidFill>
-                  <a:schemeClr val="tx1"/>
-                </a:solidFill>
-                <a:effectLst/>
-                <a:latin typeface="Courier New" pitchFamily="49" charset="0"/>
-                <a:ea typeface="Calibri" pitchFamily="34" charset="0"/>
-                <a:cs typeface="Courier New" pitchFamily="49" charset="0"/>
-              </a:rPr>
-              <a:t>RELIABLE_RELIABILITY_QOS</a:t>
-            </a:r>
-            <a:r>
-              <a:rPr kumimoji="0" lang="en-US" sz="1000" b="0" i="0" u="none" strike="noStrike" cap="none" normalizeH="0" baseline="0" dirty="0" smtClean="0">
-                <a:ln>
-                  <a:noFill/>
-                </a:ln>
-                <a:solidFill>
-                  <a:srgbClr val="0000FF"/>
-                </a:solidFill>
-                <a:effectLst/>
-                <a:latin typeface="Courier New" pitchFamily="49" charset="0"/>
-                <a:ea typeface="Calibri" pitchFamily="34" charset="0"/>
-                <a:cs typeface="Courier New" pitchFamily="49" charset="0"/>
-              </a:rPr>
-              <a:t>&lt;/</a:t>
-            </a:r>
-            <a:r>
-              <a:rPr kumimoji="0" lang="en-US" sz="1000" b="0" i="0" u="none" strike="noStrike" cap="none" normalizeH="0" baseline="0" dirty="0" smtClean="0">
-                <a:ln>
-                  <a:noFill/>
-                </a:ln>
-                <a:solidFill>
-                  <a:srgbClr val="A31515"/>
-                </a:solidFill>
-                <a:effectLst/>
-                <a:latin typeface="Courier New" pitchFamily="49" charset="0"/>
-                <a:ea typeface="Calibri" pitchFamily="34" charset="0"/>
-                <a:cs typeface="Courier New" pitchFamily="49" charset="0"/>
-              </a:rPr>
-              <a:t>kind</a:t>
-            </a:r>
-            <a:r>
-              <a:rPr kumimoji="0" lang="en-US" sz="1000" b="0" i="0" u="none" strike="noStrike" cap="none" normalizeH="0" baseline="0" dirty="0" smtClean="0">
-                <a:ln>
-                  <a:noFill/>
-                </a:ln>
-                <a:solidFill>
-                  <a:srgbClr val="0000FF"/>
-                </a:solidFill>
-                <a:effectLst/>
-                <a:latin typeface="Courier New" pitchFamily="49" charset="0"/>
-                <a:ea typeface="Calibri" pitchFamily="34" charset="0"/>
-                <a:cs typeface="Courier New" pitchFamily="49" charset="0"/>
-              </a:rPr>
-              <a:t>&gt;</a:t>
-            </a:r>
-            <a:endParaRPr kumimoji="0" lang="en-US" sz="800" b="0" i="0" u="none" strike="noStrike" cap="none" normalizeH="0" baseline="0" dirty="0" smtClean="0">
-              <a:ln>
-                <a:noFill/>
-              </a:ln>
-              <a:solidFill>
-                <a:schemeClr val="tx1"/>
-              </a:solidFill>
-              <a:effectLst/>
-              <a:latin typeface="Arial" pitchFamily="34" charset="0"/>
-              <a:cs typeface="Arial" pitchFamily="34" charset="0"/>
-            </a:endParaRPr>
-          </a:p>
-          <a:p>
-            <a:pPr marL="0" marR="0" lvl="0" indent="0" algn="l" defTabSz="914400" rtl="0" eaLnBrk="0" fontAlgn="base" latinLnBrk="0" hangingPunct="0">
-              <a:lnSpc>
-                <a:spcPct val="100000"/>
-              </a:lnSpc>
-              <a:spcBef>
-                <a:spcPct val="0"/>
-              </a:spcBef>
-              <a:spcAft>
-                <a:spcPct val="0"/>
-              </a:spcAft>
-              <a:buClrTx/>
-              <a:buSzTx/>
-              <a:buFontTx/>
-              <a:buNone/>
-              <a:tabLst/>
-            </a:pPr>
-            <a:r>
-              <a:rPr kumimoji="0" lang="en-US" sz="1000" b="0" i="0" u="none" strike="noStrike" cap="none" normalizeH="0" baseline="0" dirty="0" smtClean="0">
-                <a:ln>
-                  <a:noFill/>
-                </a:ln>
-                <a:solidFill>
-                  <a:srgbClr val="0000FF"/>
-                </a:solidFill>
-                <a:effectLst/>
-                <a:latin typeface="Courier New" pitchFamily="49" charset="0"/>
-                <a:ea typeface="Calibri" pitchFamily="34" charset="0"/>
-                <a:cs typeface="Courier New" pitchFamily="49" charset="0"/>
-              </a:rPr>
-              <a:t>        &lt;/</a:t>
-            </a:r>
-            <a:r>
-              <a:rPr kumimoji="0" lang="en-US" sz="1000" b="0" i="0" u="none" strike="noStrike" cap="none" normalizeH="0" baseline="0" dirty="0" smtClean="0">
-                <a:ln>
-                  <a:noFill/>
-                </a:ln>
-                <a:solidFill>
-                  <a:srgbClr val="A31515"/>
-                </a:solidFill>
-                <a:effectLst/>
-                <a:latin typeface="Courier New" pitchFamily="49" charset="0"/>
-                <a:ea typeface="Calibri" pitchFamily="34" charset="0"/>
-                <a:cs typeface="Courier New" pitchFamily="49" charset="0"/>
-              </a:rPr>
-              <a:t>reliability</a:t>
-            </a:r>
-            <a:r>
-              <a:rPr kumimoji="0" lang="en-US" sz="1000" b="0" i="0" u="none" strike="noStrike" cap="none" normalizeH="0" baseline="0" dirty="0" smtClean="0">
-                <a:ln>
-                  <a:noFill/>
-                </a:ln>
-                <a:solidFill>
-                  <a:srgbClr val="0000FF"/>
-                </a:solidFill>
-                <a:effectLst/>
-                <a:latin typeface="Courier New" pitchFamily="49" charset="0"/>
-                <a:ea typeface="Calibri" pitchFamily="34" charset="0"/>
-                <a:cs typeface="Courier New" pitchFamily="49" charset="0"/>
-              </a:rPr>
-              <a:t>&gt;</a:t>
-            </a:r>
-            <a:endParaRPr kumimoji="0" lang="en-US" sz="800" b="0" i="0" u="none" strike="noStrike" cap="none" normalizeH="0" baseline="0" dirty="0" smtClean="0">
-              <a:ln>
-                <a:noFill/>
-              </a:ln>
-              <a:solidFill>
-                <a:schemeClr val="tx1"/>
-              </a:solidFill>
-              <a:effectLst/>
-              <a:latin typeface="Arial" pitchFamily="34" charset="0"/>
-              <a:cs typeface="Arial" pitchFamily="34" charset="0"/>
-            </a:endParaRPr>
-          </a:p>
-          <a:p>
-            <a:pPr marL="0" marR="0" lvl="0" indent="0" algn="l" defTabSz="914400" rtl="0" eaLnBrk="0" fontAlgn="base" latinLnBrk="0" hangingPunct="0">
-              <a:lnSpc>
-                <a:spcPct val="100000"/>
-              </a:lnSpc>
-              <a:spcBef>
-                <a:spcPct val="0"/>
-              </a:spcBef>
-              <a:spcAft>
-                <a:spcPct val="0"/>
-              </a:spcAft>
-              <a:buClrTx/>
-              <a:buSzTx/>
-              <a:buFontTx/>
-              <a:buNone/>
-              <a:tabLst/>
-            </a:pPr>
-            <a:r>
-              <a:rPr kumimoji="0" lang="en-US" sz="1000" b="0" i="0" u="none" strike="noStrike" cap="none" normalizeH="0" baseline="0" dirty="0" smtClean="0">
-                <a:ln>
-                  <a:noFill/>
-                </a:ln>
-                <a:solidFill>
-                  <a:srgbClr val="0000FF"/>
-                </a:solidFill>
-                <a:effectLst/>
-                <a:latin typeface="Courier New" pitchFamily="49" charset="0"/>
-                <a:ea typeface="Calibri" pitchFamily="34" charset="0"/>
-                <a:cs typeface="Courier New" pitchFamily="49" charset="0"/>
-              </a:rPr>
-              <a:t>    </a:t>
-            </a:r>
-            <a:endParaRPr kumimoji="0" lang="en-US" sz="800" b="0" i="0" u="none" strike="noStrike" cap="none" normalizeH="0" baseline="0" dirty="0" smtClean="0">
-              <a:ln>
-                <a:noFill/>
-              </a:ln>
-              <a:solidFill>
-                <a:schemeClr val="tx1"/>
-              </a:solidFill>
-              <a:effectLst/>
-              <a:latin typeface="Arial" pitchFamily="34" charset="0"/>
-              <a:cs typeface="Arial" pitchFamily="34" charset="0"/>
-            </a:endParaRPr>
-          </a:p>
-          <a:p>
-            <a:pPr marL="0" marR="0" lvl="0" indent="0" algn="l" defTabSz="914400" rtl="0" eaLnBrk="0" fontAlgn="base" latinLnBrk="0" hangingPunct="0">
-              <a:lnSpc>
-                <a:spcPct val="100000"/>
-              </a:lnSpc>
-              <a:spcBef>
-                <a:spcPct val="0"/>
-              </a:spcBef>
-              <a:spcAft>
-                <a:spcPct val="0"/>
-              </a:spcAft>
-              <a:buClrTx/>
-              <a:buSzTx/>
-              <a:buFontTx/>
-              <a:buNone/>
-              <a:tabLst/>
-            </a:pPr>
-            <a:r>
-              <a:rPr kumimoji="0" lang="en-US" sz="1000" b="0" i="0" u="none" strike="noStrike" cap="none" normalizeH="0" baseline="0" dirty="0" smtClean="0">
-                <a:ln>
-                  <a:noFill/>
-                </a:ln>
-                <a:solidFill>
-                  <a:srgbClr val="0000FF"/>
-                </a:solidFill>
-                <a:effectLst/>
-                <a:latin typeface="Courier New" pitchFamily="49" charset="0"/>
-                <a:ea typeface="Calibri" pitchFamily="34" charset="0"/>
-                <a:cs typeface="Courier New" pitchFamily="49" charset="0"/>
-              </a:rPr>
-              <a:t>        &lt;</a:t>
-            </a:r>
-            <a:r>
-              <a:rPr kumimoji="0" lang="en-US" sz="1000" b="0" i="0" u="none" strike="noStrike" cap="none" normalizeH="0" baseline="0" dirty="0" smtClean="0">
-                <a:ln>
-                  <a:noFill/>
-                </a:ln>
-                <a:solidFill>
-                  <a:srgbClr val="A31515"/>
-                </a:solidFill>
-                <a:effectLst/>
-                <a:latin typeface="Courier New" pitchFamily="49" charset="0"/>
-                <a:ea typeface="Calibri" pitchFamily="34" charset="0"/>
-                <a:cs typeface="Courier New" pitchFamily="49" charset="0"/>
-              </a:rPr>
-              <a:t>history</a:t>
-            </a:r>
-            <a:r>
-              <a:rPr kumimoji="0" lang="en-US" sz="1000" b="0" i="0" u="none" strike="noStrike" cap="none" normalizeH="0" baseline="0" dirty="0" smtClean="0">
-                <a:ln>
-                  <a:noFill/>
-                </a:ln>
-                <a:solidFill>
-                  <a:srgbClr val="0000FF"/>
-                </a:solidFill>
-                <a:effectLst/>
-                <a:latin typeface="Courier New" pitchFamily="49" charset="0"/>
-                <a:ea typeface="Calibri" pitchFamily="34" charset="0"/>
-                <a:cs typeface="Courier New" pitchFamily="49" charset="0"/>
-              </a:rPr>
-              <a:t>&gt;</a:t>
-            </a:r>
-            <a:endParaRPr kumimoji="0" lang="en-US" sz="800" b="0" i="0" u="none" strike="noStrike" cap="none" normalizeH="0" baseline="0" dirty="0" smtClean="0">
-              <a:ln>
-                <a:noFill/>
-              </a:ln>
-              <a:solidFill>
-                <a:schemeClr val="tx1"/>
-              </a:solidFill>
-              <a:effectLst/>
-              <a:latin typeface="Arial" pitchFamily="34" charset="0"/>
-              <a:cs typeface="Arial" pitchFamily="34" charset="0"/>
-            </a:endParaRPr>
-          </a:p>
-          <a:p>
-            <a:pPr marL="0" marR="0" lvl="0" indent="0" algn="l" defTabSz="914400" rtl="0" eaLnBrk="0" fontAlgn="base" latinLnBrk="0" hangingPunct="0">
-              <a:lnSpc>
-                <a:spcPct val="100000"/>
-              </a:lnSpc>
-              <a:spcBef>
-                <a:spcPct val="0"/>
-              </a:spcBef>
-              <a:spcAft>
-                <a:spcPct val="0"/>
-              </a:spcAft>
-              <a:buClrTx/>
-              <a:buSzTx/>
-              <a:buFontTx/>
-              <a:buNone/>
-              <a:tabLst/>
-            </a:pPr>
-            <a:r>
-              <a:rPr kumimoji="0" lang="en-US" sz="1000" b="0" i="0" u="none" strike="noStrike" cap="none" normalizeH="0" baseline="0" dirty="0" smtClean="0">
-                <a:ln>
-                  <a:noFill/>
-                </a:ln>
-                <a:solidFill>
-                  <a:srgbClr val="0000FF"/>
-                </a:solidFill>
-                <a:effectLst/>
-                <a:latin typeface="Courier New" pitchFamily="49" charset="0"/>
-                <a:ea typeface="Calibri" pitchFamily="34" charset="0"/>
-                <a:cs typeface="Courier New" pitchFamily="49" charset="0"/>
-              </a:rPr>
-              <a:t>            &lt;</a:t>
-            </a:r>
-            <a:r>
-              <a:rPr kumimoji="0" lang="en-US" sz="1000" b="0" i="0" u="none" strike="noStrike" cap="none" normalizeH="0" baseline="0" dirty="0" smtClean="0">
-                <a:ln>
-                  <a:noFill/>
-                </a:ln>
-                <a:solidFill>
-                  <a:srgbClr val="A31515"/>
-                </a:solidFill>
-                <a:effectLst/>
-                <a:latin typeface="Courier New" pitchFamily="49" charset="0"/>
-                <a:ea typeface="Calibri" pitchFamily="34" charset="0"/>
-                <a:cs typeface="Courier New" pitchFamily="49" charset="0"/>
-              </a:rPr>
-              <a:t>kind</a:t>
-            </a:r>
-            <a:r>
-              <a:rPr kumimoji="0" lang="en-US" sz="1000" b="0" i="0" u="none" strike="noStrike" cap="none" normalizeH="0" baseline="0" dirty="0" smtClean="0">
-                <a:ln>
-                  <a:noFill/>
-                </a:ln>
-                <a:solidFill>
-                  <a:srgbClr val="0000FF"/>
-                </a:solidFill>
-                <a:effectLst/>
-                <a:latin typeface="Courier New" pitchFamily="49" charset="0"/>
-                <a:ea typeface="Calibri" pitchFamily="34" charset="0"/>
-                <a:cs typeface="Courier New" pitchFamily="49" charset="0"/>
-              </a:rPr>
-              <a:t>&gt;</a:t>
-            </a:r>
-            <a:r>
-              <a:rPr kumimoji="0" lang="en-US" sz="1000" b="0" i="0" u="none" strike="noStrike" cap="none" normalizeH="0" baseline="0" dirty="0" smtClean="0">
-                <a:ln>
-                  <a:noFill/>
-                </a:ln>
-                <a:solidFill>
-                  <a:schemeClr val="tx1"/>
-                </a:solidFill>
-                <a:effectLst/>
-                <a:latin typeface="Courier New" pitchFamily="49" charset="0"/>
-                <a:ea typeface="Calibri" pitchFamily="34" charset="0"/>
-                <a:cs typeface="Courier New" pitchFamily="49" charset="0"/>
-              </a:rPr>
-              <a:t>KEEP_ALL_HISTORY_QOS</a:t>
-            </a:r>
-            <a:r>
-              <a:rPr kumimoji="0" lang="en-US" sz="1000" b="0" i="0" u="none" strike="noStrike" cap="none" normalizeH="0" baseline="0" dirty="0" smtClean="0">
-                <a:ln>
-                  <a:noFill/>
-                </a:ln>
-                <a:solidFill>
-                  <a:srgbClr val="0000FF"/>
-                </a:solidFill>
-                <a:effectLst/>
-                <a:latin typeface="Courier New" pitchFamily="49" charset="0"/>
-                <a:ea typeface="Calibri" pitchFamily="34" charset="0"/>
-                <a:cs typeface="Courier New" pitchFamily="49" charset="0"/>
-              </a:rPr>
-              <a:t>&lt;/</a:t>
-            </a:r>
-            <a:r>
-              <a:rPr kumimoji="0" lang="en-US" sz="1000" b="0" i="0" u="none" strike="noStrike" cap="none" normalizeH="0" baseline="0" dirty="0" smtClean="0">
-                <a:ln>
-                  <a:noFill/>
-                </a:ln>
-                <a:solidFill>
-                  <a:srgbClr val="A31515"/>
-                </a:solidFill>
-                <a:effectLst/>
-                <a:latin typeface="Courier New" pitchFamily="49" charset="0"/>
-                <a:ea typeface="Calibri" pitchFamily="34" charset="0"/>
-                <a:cs typeface="Courier New" pitchFamily="49" charset="0"/>
-              </a:rPr>
-              <a:t>kind</a:t>
-            </a:r>
-            <a:r>
-              <a:rPr kumimoji="0" lang="en-US" sz="1000" b="0" i="0" u="none" strike="noStrike" cap="none" normalizeH="0" baseline="0" dirty="0" smtClean="0">
-                <a:ln>
-                  <a:noFill/>
-                </a:ln>
-                <a:solidFill>
-                  <a:srgbClr val="0000FF"/>
-                </a:solidFill>
-                <a:effectLst/>
-                <a:latin typeface="Courier New" pitchFamily="49" charset="0"/>
-                <a:ea typeface="Calibri" pitchFamily="34" charset="0"/>
-                <a:cs typeface="Courier New" pitchFamily="49" charset="0"/>
-              </a:rPr>
-              <a:t>&gt;</a:t>
-            </a:r>
-            <a:endParaRPr kumimoji="0" lang="en-US" sz="800" b="0" i="0" u="none" strike="noStrike" cap="none" normalizeH="0" baseline="0" dirty="0" smtClean="0">
-              <a:ln>
-                <a:noFill/>
-              </a:ln>
-              <a:solidFill>
-                <a:schemeClr val="tx1"/>
-              </a:solidFill>
-              <a:effectLst/>
-              <a:latin typeface="Arial" pitchFamily="34" charset="0"/>
-              <a:cs typeface="Arial" pitchFamily="34" charset="0"/>
-            </a:endParaRPr>
-          </a:p>
-          <a:p>
-            <a:pPr marL="0" marR="0" lvl="0" indent="0" algn="l" defTabSz="914400" rtl="0" eaLnBrk="0" fontAlgn="base" latinLnBrk="0" hangingPunct="0">
-              <a:lnSpc>
-                <a:spcPct val="100000"/>
-              </a:lnSpc>
-              <a:spcBef>
-                <a:spcPct val="0"/>
-              </a:spcBef>
-              <a:spcAft>
-                <a:spcPct val="0"/>
-              </a:spcAft>
-              <a:buClrTx/>
-              <a:buSzTx/>
-              <a:buFontTx/>
-              <a:buNone/>
-              <a:tabLst/>
-            </a:pPr>
-            <a:r>
-              <a:rPr kumimoji="0" lang="en-US" sz="1000" b="0" i="0" u="none" strike="noStrike" cap="none" normalizeH="0" baseline="0" dirty="0" smtClean="0">
-                <a:ln>
-                  <a:noFill/>
-                </a:ln>
-                <a:solidFill>
-                  <a:srgbClr val="0000FF"/>
-                </a:solidFill>
-                <a:effectLst/>
-                <a:latin typeface="Courier New" pitchFamily="49" charset="0"/>
-                <a:ea typeface="Calibri" pitchFamily="34" charset="0"/>
-                <a:cs typeface="Courier New" pitchFamily="49" charset="0"/>
-              </a:rPr>
-              <a:t>        &lt;/</a:t>
-            </a:r>
-            <a:r>
-              <a:rPr kumimoji="0" lang="en-US" sz="1000" b="0" i="0" u="none" strike="noStrike" cap="none" normalizeH="0" baseline="0" dirty="0" smtClean="0">
-                <a:ln>
-                  <a:noFill/>
-                </a:ln>
-                <a:solidFill>
-                  <a:srgbClr val="A31515"/>
-                </a:solidFill>
-                <a:effectLst/>
-                <a:latin typeface="Courier New" pitchFamily="49" charset="0"/>
-                <a:ea typeface="Calibri" pitchFamily="34" charset="0"/>
-                <a:cs typeface="Courier New" pitchFamily="49" charset="0"/>
-              </a:rPr>
-              <a:t>history</a:t>
-            </a:r>
-            <a:r>
-              <a:rPr kumimoji="0" lang="en-US" sz="1000" b="0" i="0" u="none" strike="noStrike" cap="none" normalizeH="0" baseline="0" dirty="0" smtClean="0">
-                <a:ln>
-                  <a:noFill/>
-                </a:ln>
-                <a:solidFill>
-                  <a:srgbClr val="0000FF"/>
-                </a:solidFill>
-                <a:effectLst/>
-                <a:latin typeface="Courier New" pitchFamily="49" charset="0"/>
-                <a:ea typeface="Calibri" pitchFamily="34" charset="0"/>
-                <a:cs typeface="Courier New" pitchFamily="49" charset="0"/>
-              </a:rPr>
-              <a:t>&gt;</a:t>
-            </a:r>
-            <a:endParaRPr kumimoji="0" lang="en-US" sz="800" b="0" i="0" u="none" strike="noStrike" cap="none" normalizeH="0" baseline="0" dirty="0" smtClean="0">
-              <a:ln>
-                <a:noFill/>
-              </a:ln>
-              <a:solidFill>
-                <a:schemeClr val="tx1"/>
-              </a:solidFill>
-              <a:effectLst/>
-              <a:latin typeface="Arial" pitchFamily="34" charset="0"/>
-              <a:cs typeface="Arial" pitchFamily="34" charset="0"/>
-            </a:endParaRPr>
-          </a:p>
-          <a:p>
-            <a:pPr marL="0" marR="0" lvl="0" indent="0" algn="l" defTabSz="914400" rtl="0" eaLnBrk="0" fontAlgn="base" latinLnBrk="0" hangingPunct="0">
-              <a:lnSpc>
-                <a:spcPct val="100000"/>
-              </a:lnSpc>
-              <a:spcBef>
-                <a:spcPct val="0"/>
-              </a:spcBef>
-              <a:spcAft>
-                <a:spcPct val="0"/>
-              </a:spcAft>
-              <a:buClrTx/>
-              <a:buSzTx/>
-              <a:buFontTx/>
-              <a:buNone/>
-              <a:tabLst/>
-            </a:pPr>
-            <a:r>
-              <a:rPr kumimoji="0" lang="en-US" sz="1000" b="0" i="0" u="none" strike="noStrike" cap="none" normalizeH="0" baseline="0" dirty="0" smtClean="0">
-                <a:ln>
-                  <a:noFill/>
-                </a:ln>
-                <a:solidFill>
-                  <a:srgbClr val="0000FF"/>
-                </a:solidFill>
-                <a:effectLst/>
-                <a:latin typeface="Courier New" pitchFamily="49" charset="0"/>
-                <a:ea typeface="Calibri" pitchFamily="34" charset="0"/>
-                <a:cs typeface="Courier New" pitchFamily="49" charset="0"/>
-              </a:rPr>
-              <a:t>    &lt;/</a:t>
-            </a:r>
-            <a:r>
-              <a:rPr kumimoji="0" lang="en-US" sz="1000" b="0" i="0" u="none" strike="noStrike" cap="none" normalizeH="0" baseline="0" dirty="0" err="1" smtClean="0">
-                <a:ln>
-                  <a:noFill/>
-                </a:ln>
-                <a:solidFill>
-                  <a:srgbClr val="A31515"/>
-                </a:solidFill>
-                <a:effectLst/>
-                <a:latin typeface="Courier New" pitchFamily="49" charset="0"/>
-                <a:ea typeface="Calibri" pitchFamily="34" charset="0"/>
-                <a:cs typeface="Courier New" pitchFamily="49" charset="0"/>
-              </a:rPr>
-              <a:t>datareader_qos</a:t>
-            </a:r>
-            <a:r>
-              <a:rPr kumimoji="0" lang="en-US" sz="1000" b="0" i="0" u="none" strike="noStrike" cap="none" normalizeH="0" baseline="0" dirty="0" smtClean="0">
-                <a:ln>
-                  <a:noFill/>
-                </a:ln>
-                <a:solidFill>
-                  <a:srgbClr val="0000FF"/>
-                </a:solidFill>
-                <a:effectLst/>
-                <a:latin typeface="Courier New" pitchFamily="49" charset="0"/>
-                <a:ea typeface="Calibri" pitchFamily="34" charset="0"/>
-                <a:cs typeface="Courier New" pitchFamily="49" charset="0"/>
-              </a:rPr>
-              <a:t>&gt;</a:t>
-            </a:r>
-            <a:endParaRPr kumimoji="0" lang="en-US" sz="800" b="0" i="0" u="none" strike="noStrike" cap="none" normalizeH="0" baseline="0" dirty="0" smtClean="0">
-              <a:ln>
-                <a:noFill/>
-              </a:ln>
-              <a:solidFill>
-                <a:schemeClr val="tx1"/>
-              </a:solidFill>
-              <a:effectLst/>
-              <a:latin typeface="Arial" pitchFamily="34" charset="0"/>
-              <a:cs typeface="Arial" pitchFamily="34" charset="0"/>
-            </a:endParaRPr>
-          </a:p>
-          <a:p>
-            <a:pPr marL="0" marR="0" lvl="0" indent="0" algn="l" defTabSz="914400" rtl="0" eaLnBrk="0" fontAlgn="base" latinLnBrk="0" hangingPunct="0">
-              <a:lnSpc>
-                <a:spcPct val="100000"/>
-              </a:lnSpc>
-              <a:spcBef>
-                <a:spcPct val="0"/>
-              </a:spcBef>
-              <a:spcAft>
-                <a:spcPct val="0"/>
-              </a:spcAft>
-              <a:buClrTx/>
-              <a:buSzTx/>
-              <a:buFontTx/>
-              <a:buNone/>
-              <a:tabLst/>
-            </a:pPr>
-            <a:r>
-              <a:rPr kumimoji="0" lang="en-US" sz="1000" b="0" i="0" u="none" strike="noStrike" cap="none" normalizeH="0" baseline="0" dirty="0" smtClean="0">
-                <a:ln>
-                  <a:noFill/>
-                </a:ln>
-                <a:solidFill>
-                  <a:srgbClr val="0000FF"/>
-                </a:solidFill>
-                <a:effectLst/>
-                <a:latin typeface="Courier New" pitchFamily="49" charset="0"/>
-                <a:ea typeface="Calibri" pitchFamily="34" charset="0"/>
-                <a:cs typeface="Courier New" pitchFamily="49" charset="0"/>
-              </a:rPr>
-              <a:t>&lt;/</a:t>
-            </a:r>
-            <a:r>
-              <a:rPr kumimoji="0" lang="en-US" sz="1000" b="0" i="0" u="none" strike="noStrike" cap="none" normalizeH="0" baseline="0" dirty="0" err="1" smtClean="0">
-                <a:ln>
-                  <a:noFill/>
-                </a:ln>
-                <a:solidFill>
-                  <a:srgbClr val="A31515"/>
-                </a:solidFill>
-                <a:effectLst/>
-                <a:latin typeface="Courier New" pitchFamily="49" charset="0"/>
-                <a:ea typeface="Calibri" pitchFamily="34" charset="0"/>
-                <a:cs typeface="Courier New" pitchFamily="49" charset="0"/>
-              </a:rPr>
-              <a:t>qos_profile</a:t>
-            </a:r>
-            <a:r>
-              <a:rPr kumimoji="0" lang="en-US" sz="1000" b="0" i="0" u="none" strike="noStrike" cap="none" normalizeH="0" baseline="0" dirty="0" smtClean="0">
-                <a:ln>
-                  <a:noFill/>
-                </a:ln>
-                <a:solidFill>
-                  <a:srgbClr val="0000FF"/>
-                </a:solidFill>
-                <a:effectLst/>
-                <a:latin typeface="Courier New" pitchFamily="49" charset="0"/>
-                <a:ea typeface="Calibri" pitchFamily="34" charset="0"/>
-                <a:cs typeface="Courier New" pitchFamily="49" charset="0"/>
-              </a:rPr>
-              <a:t>&gt;</a:t>
-            </a:r>
-            <a:endParaRPr kumimoji="0" lang="en-US" sz="1800" b="0" i="0" u="none" strike="noStrike" cap="none" normalizeH="0" baseline="0" dirty="0" smtClean="0">
-              <a:ln>
-                <a:noFill/>
-              </a:ln>
-              <a:solidFill>
-                <a:schemeClr val="tx1"/>
-              </a:solidFill>
-              <a:effectLst/>
-              <a:latin typeface="Arial" pitchFamily="34" charset="0"/>
-              <a:cs typeface="Arial" pitchFamily="34" charset="0"/>
-            </a:endParaRPr>
-          </a:p>
-        </p:txBody>
-      </p:sp>
-      <p:sp>
-        <p:nvSpPr>
-          <p:cNvPr id="5" name="Rectangle 1"/>
-          <p:cNvSpPr>
-            <a:spLocks noChangeArrowheads="1"/>
-          </p:cNvSpPr>
-          <p:nvPr/>
-        </p:nvSpPr>
-        <p:spPr bwMode="auto">
-          <a:xfrm>
-            <a:off x="1619672" y="1916832"/>
-            <a:ext cx="5362575" cy="741363"/>
-          </a:xfrm>
-          <a:prstGeom prst="rect">
-            <a:avLst/>
-          </a:prstGeom>
-          <a:gradFill rotWithShape="0">
-            <a:gsLst>
-              <a:gs pos="0">
-                <a:srgbClr val="95B3D7"/>
-              </a:gs>
-              <a:gs pos="50000">
-                <a:srgbClr val="DBE5F1"/>
-              </a:gs>
-              <a:gs pos="100000">
-                <a:srgbClr val="95B3D7"/>
-              </a:gs>
-            </a:gsLst>
-            <a:lin ang="18900000" scaled="1"/>
-          </a:gradFill>
-          <a:ln w="12700">
-            <a:solidFill>
-              <a:srgbClr val="95B3D7"/>
-            </a:solidFill>
-            <a:miter lim="800000"/>
-            <a:headEnd/>
-            <a:tailEnd/>
-          </a:ln>
-          <a:effectLst>
-            <a:outerShdw dist="28398" dir="3806097" algn="ctr" rotWithShape="0">
-              <a:srgbClr val="243F60">
-                <a:alpha val="50000"/>
-              </a:srgbClr>
-            </a:outerShdw>
-          </a:effectLst>
-        </p:spPr>
-        <p:txBody>
-          <a:bodyPr vert="horz" wrap="square" lIns="91440" tIns="45720" rIns="91440" bIns="45720" numCol="1" anchor="t" anchorCtr="0" compatLnSpc="1">
-            <a:prstTxWarp prst="textNoShape">
-              <a:avLst/>
-            </a:prstTxWarp>
-          </a:bodyPr>
-          <a:lstStyle/>
-          <a:p>
-            <a:pPr marL="0" marR="0" lvl="0" indent="0" algn="l" defTabSz="914400" rtl="0" eaLnBrk="1" fontAlgn="base" latinLnBrk="0" hangingPunct="1">
-              <a:lnSpc>
-                <a:spcPct val="100000"/>
-              </a:lnSpc>
-              <a:spcBef>
-                <a:spcPct val="0"/>
-              </a:spcBef>
-              <a:spcAft>
-                <a:spcPct val="0"/>
-              </a:spcAft>
-              <a:buClrTx/>
-              <a:buSzTx/>
-              <a:buFontTx/>
-              <a:buNone/>
-              <a:tabLst/>
-            </a:pPr>
-            <a:r>
-              <a:rPr kumimoji="0" lang="en-US" sz="1000" b="0" i="0" u="none" strike="noStrike" cap="none" normalizeH="0" baseline="0" dirty="0" smtClean="0">
-                <a:ln>
-                  <a:noFill/>
-                </a:ln>
-                <a:solidFill>
-                  <a:srgbClr val="0000FF"/>
-                </a:solidFill>
-                <a:effectLst/>
-                <a:latin typeface="Courier New" pitchFamily="49" charset="0"/>
-                <a:ea typeface="Calibri" pitchFamily="34" charset="0"/>
-                <a:cs typeface="Courier New" pitchFamily="49" charset="0"/>
-              </a:rPr>
-              <a:t>interface</a:t>
-            </a:r>
-            <a:r>
-              <a:rPr kumimoji="0" lang="en-US" sz="1000" b="0" i="0" u="none" strike="noStrike" cap="none" normalizeH="0" baseline="0" dirty="0" smtClean="0">
-                <a:ln>
-                  <a:noFill/>
-                </a:ln>
-                <a:solidFill>
-                  <a:schemeClr val="tx1"/>
-                </a:solidFill>
-                <a:effectLst/>
-                <a:latin typeface="Courier New" pitchFamily="49" charset="0"/>
-                <a:ea typeface="Calibri" pitchFamily="34" charset="0"/>
-                <a:cs typeface="Courier New" pitchFamily="49" charset="0"/>
-              </a:rPr>
-              <a:t> Bank</a:t>
-            </a:r>
-            <a:endParaRPr kumimoji="0" lang="en-US" sz="800" b="0" i="0" u="none" strike="noStrike" cap="none" normalizeH="0" baseline="0" dirty="0" smtClean="0">
-              <a:ln>
-                <a:noFill/>
-              </a:ln>
-              <a:solidFill>
-                <a:schemeClr val="tx1"/>
-              </a:solidFill>
-              <a:effectLst/>
-              <a:latin typeface="Arial" pitchFamily="34" charset="0"/>
-              <a:cs typeface="Arial" pitchFamily="34" charset="0"/>
-            </a:endParaRPr>
-          </a:p>
-          <a:p>
-            <a:pPr marL="0" marR="0" lvl="0" indent="0" algn="l" defTabSz="914400" rtl="0" eaLnBrk="0" fontAlgn="base" latinLnBrk="0" hangingPunct="0">
-              <a:lnSpc>
-                <a:spcPct val="100000"/>
-              </a:lnSpc>
-              <a:spcBef>
-                <a:spcPct val="0"/>
-              </a:spcBef>
-              <a:spcAft>
-                <a:spcPct val="0"/>
-              </a:spcAft>
-              <a:buClrTx/>
-              <a:buSzTx/>
-              <a:buFontTx/>
-              <a:buNone/>
-              <a:tabLst/>
-            </a:pPr>
-            <a:r>
-              <a:rPr kumimoji="0" lang="en-US" sz="1000" b="0" i="0" u="none" strike="noStrike" cap="none" normalizeH="0" baseline="0" dirty="0" smtClean="0">
-                <a:ln>
-                  <a:noFill/>
-                </a:ln>
-                <a:solidFill>
-                  <a:schemeClr val="tx1"/>
-                </a:solidFill>
-                <a:effectLst/>
-                <a:latin typeface="Courier New" pitchFamily="49" charset="0"/>
-                <a:ea typeface="Calibri" pitchFamily="34" charset="0"/>
-                <a:cs typeface="Courier New" pitchFamily="49" charset="0"/>
-              </a:rPr>
-              <a:t>{</a:t>
-            </a:r>
-            <a:endParaRPr kumimoji="0" lang="en-US" sz="800" b="0" i="0" u="none" strike="noStrike" cap="none" normalizeH="0" baseline="0" dirty="0" smtClean="0">
-              <a:ln>
-                <a:noFill/>
-              </a:ln>
-              <a:solidFill>
-                <a:schemeClr val="tx1"/>
-              </a:solidFill>
-              <a:effectLst/>
-              <a:latin typeface="Arial" pitchFamily="34" charset="0"/>
-              <a:cs typeface="Arial" pitchFamily="34" charset="0"/>
-            </a:endParaRPr>
-          </a:p>
-          <a:p>
-            <a:pPr marL="0" marR="0" lvl="0" indent="0" algn="l" defTabSz="914400" rtl="0" eaLnBrk="0" fontAlgn="base" latinLnBrk="0" hangingPunct="0">
-              <a:lnSpc>
-                <a:spcPct val="100000"/>
-              </a:lnSpc>
-              <a:spcBef>
-                <a:spcPct val="0"/>
-              </a:spcBef>
-              <a:spcAft>
-                <a:spcPct val="0"/>
-              </a:spcAft>
-              <a:buClrTx/>
-              <a:buSzTx/>
-              <a:buFontTx/>
-              <a:buNone/>
-              <a:tabLst/>
-            </a:pPr>
-            <a:r>
-              <a:rPr kumimoji="0" lang="en-US" sz="1000" b="0" i="0" u="none" strike="noStrike" cap="none" normalizeH="0" baseline="0" dirty="0" smtClean="0">
-                <a:ln>
-                  <a:noFill/>
-                </a:ln>
-                <a:solidFill>
-                  <a:schemeClr val="tx1"/>
-                </a:solidFill>
-                <a:effectLst/>
-                <a:latin typeface="Courier New" pitchFamily="49" charset="0"/>
-                <a:ea typeface="Calibri" pitchFamily="34" charset="0"/>
-                <a:cs typeface="Courier New" pitchFamily="49" charset="0"/>
-              </a:rPr>
-              <a:t>	</a:t>
-            </a:r>
-            <a:r>
-              <a:rPr kumimoji="0" lang="en-US" sz="1000" b="0" i="0" u="none" strike="noStrike" cap="none" normalizeH="0" baseline="0" dirty="0" err="1" smtClean="0">
-                <a:ln>
-                  <a:noFill/>
-                </a:ln>
-                <a:solidFill>
-                  <a:schemeClr val="tx1"/>
-                </a:solidFill>
-                <a:effectLst/>
-                <a:latin typeface="Courier New" pitchFamily="49" charset="0"/>
-                <a:ea typeface="Calibri" pitchFamily="34" charset="0"/>
-                <a:cs typeface="Courier New" pitchFamily="49" charset="0"/>
-              </a:rPr>
-              <a:t>ReturnCode</a:t>
-            </a:r>
-            <a:r>
-              <a:rPr kumimoji="0" lang="en-US" sz="1000" b="0" i="0" u="none" strike="noStrike" cap="none" normalizeH="0" baseline="0" dirty="0" smtClean="0">
-                <a:ln>
-                  <a:noFill/>
-                </a:ln>
-                <a:solidFill>
-                  <a:schemeClr val="tx1"/>
-                </a:solidFill>
-                <a:effectLst/>
-                <a:latin typeface="Courier New" pitchFamily="49" charset="0"/>
-                <a:ea typeface="Calibri" pitchFamily="34" charset="0"/>
-                <a:cs typeface="Courier New" pitchFamily="49" charset="0"/>
-              </a:rPr>
-              <a:t> deposit(</a:t>
-            </a:r>
-            <a:r>
-              <a:rPr kumimoji="0" lang="en-US" sz="1000" b="0" i="0" u="none" strike="noStrike" cap="none" normalizeH="0" baseline="0" dirty="0" smtClean="0">
-                <a:ln>
-                  <a:noFill/>
-                </a:ln>
-                <a:solidFill>
-                  <a:srgbClr val="0000FF"/>
-                </a:solidFill>
-                <a:effectLst/>
-                <a:latin typeface="Courier New" pitchFamily="49" charset="0"/>
-                <a:ea typeface="Calibri" pitchFamily="34" charset="0"/>
-                <a:cs typeface="Courier New" pitchFamily="49" charset="0"/>
-              </a:rPr>
-              <a:t>in</a:t>
-            </a:r>
-            <a:r>
-              <a:rPr kumimoji="0" lang="en-US" sz="1000" b="0" i="0" u="none" strike="noStrike" cap="none" normalizeH="0" baseline="0" dirty="0" smtClean="0">
-                <a:ln>
-                  <a:noFill/>
-                </a:ln>
-                <a:solidFill>
-                  <a:schemeClr val="tx1"/>
-                </a:solidFill>
-                <a:effectLst/>
-                <a:latin typeface="Courier New" pitchFamily="49" charset="0"/>
-                <a:ea typeface="Calibri" pitchFamily="34" charset="0"/>
-                <a:cs typeface="Courier New" pitchFamily="49" charset="0"/>
-              </a:rPr>
-              <a:t> Account ac, </a:t>
-            </a:r>
-            <a:r>
-              <a:rPr kumimoji="0" lang="en-US" sz="1000" b="0" i="0" u="none" strike="noStrike" cap="none" normalizeH="0" baseline="0" dirty="0" smtClean="0">
-                <a:ln>
-                  <a:noFill/>
-                </a:ln>
-                <a:solidFill>
-                  <a:srgbClr val="0000FF"/>
-                </a:solidFill>
-                <a:effectLst/>
-                <a:latin typeface="Courier New" pitchFamily="49" charset="0"/>
-                <a:ea typeface="Calibri" pitchFamily="34" charset="0"/>
-                <a:cs typeface="Courier New" pitchFamily="49" charset="0"/>
-              </a:rPr>
-              <a:t>in</a:t>
-            </a:r>
-            <a:r>
-              <a:rPr kumimoji="0" lang="en-US" sz="1000" b="0" i="0" u="none" strike="noStrike" cap="none" normalizeH="0" baseline="0" dirty="0" smtClean="0">
-                <a:ln>
-                  <a:noFill/>
-                </a:ln>
-                <a:solidFill>
-                  <a:schemeClr val="tx1"/>
-                </a:solidFill>
-                <a:effectLst/>
-                <a:latin typeface="Courier New" pitchFamily="49" charset="0"/>
-                <a:ea typeface="Calibri" pitchFamily="34" charset="0"/>
-                <a:cs typeface="Courier New" pitchFamily="49" charset="0"/>
-              </a:rPr>
+              <a:rPr lang="es-ES" dirty="0" err="1" smtClean="0"/>
+              <a:t>synchronous</a:t>
+            </a:r>
+            <a:r>
+              <a:rPr lang="es-ES" dirty="0" smtClean="0"/>
+              <a:t>, </a:t>
+            </a:r>
+            <a:r>
+              <a:rPr lang="es-ES" dirty="0" err="1" smtClean="0"/>
+              <a:t>asynchronous</a:t>
+            </a:r>
+            <a:r>
+              <a:rPr lang="es-ES" dirty="0" smtClean="0"/>
+              <a:t> and </a:t>
+            </a:r>
+            <a:r>
+              <a:rPr lang="es-ES" dirty="0" err="1" smtClean="0"/>
+              <a:t>oneway</a:t>
+            </a:r>
+            <a:r>
+              <a:rPr lang="es-ES" dirty="0" smtClean="0"/>
               <a:t> </a:t>
             </a:r>
             <a:r>
-              <a:rPr kumimoji="0" lang="en-US" sz="1000" b="0" i="0" u="none" strike="noStrike" cap="none" normalizeH="0" baseline="0" dirty="0" smtClean="0">
-                <a:ln>
-                  <a:noFill/>
-                </a:ln>
-                <a:solidFill>
-                  <a:srgbClr val="0000FF"/>
-                </a:solidFill>
-                <a:effectLst/>
-                <a:latin typeface="Courier New" pitchFamily="49" charset="0"/>
-                <a:ea typeface="Calibri" pitchFamily="34" charset="0"/>
-                <a:cs typeface="Courier New" pitchFamily="49" charset="0"/>
-              </a:rPr>
-              <a:t>long</a:t>
-            </a:r>
-            <a:r>
-              <a:rPr kumimoji="0" lang="en-US" sz="1000" b="0" i="0" u="none" strike="noStrike" cap="none" normalizeH="0" baseline="0" dirty="0" smtClean="0">
-                <a:ln>
-                  <a:noFill/>
-                </a:ln>
-                <a:solidFill>
-                  <a:schemeClr val="tx1"/>
-                </a:solidFill>
-                <a:effectLst/>
-                <a:latin typeface="Courier New" pitchFamily="49" charset="0"/>
-                <a:ea typeface="Calibri" pitchFamily="34" charset="0"/>
-                <a:cs typeface="Courier New" pitchFamily="49" charset="0"/>
-              </a:rPr>
-              <a:t> money);</a:t>
-            </a:r>
-            <a:endParaRPr kumimoji="0" lang="en-US" sz="800" b="0" i="0" u="none" strike="noStrike" cap="none" normalizeH="0" baseline="0" dirty="0" smtClean="0">
-              <a:ln>
-                <a:noFill/>
-              </a:ln>
-              <a:solidFill>
-                <a:schemeClr val="tx1"/>
-              </a:solidFill>
-              <a:effectLst/>
-              <a:latin typeface="Arial" pitchFamily="34" charset="0"/>
-              <a:cs typeface="Arial" pitchFamily="34" charset="0"/>
-            </a:endParaRPr>
-          </a:p>
-          <a:p>
-            <a:pPr lvl="0" eaLnBrk="0" fontAlgn="base" hangingPunct="0">
-              <a:spcBef>
-                <a:spcPct val="0"/>
-              </a:spcBef>
-              <a:spcAft>
-                <a:spcPct val="0"/>
-              </a:spcAft>
-            </a:pPr>
-            <a:r>
-              <a:rPr kumimoji="0" lang="es-ES" sz="1000" b="0" i="0" u="none" strike="noStrike" cap="none" normalizeH="0" baseline="0" dirty="0" smtClean="0">
-                <a:ln>
-                  <a:noFill/>
-                </a:ln>
-                <a:solidFill>
-                  <a:schemeClr val="tx1"/>
-                </a:solidFill>
-                <a:effectLst/>
-                <a:latin typeface="Courier New" pitchFamily="49" charset="0"/>
-                <a:ea typeface="Calibri" pitchFamily="34" charset="0"/>
-                <a:cs typeface="Courier New" pitchFamily="49" charset="0"/>
-              </a:rPr>
-              <a:t>}; </a:t>
-            </a:r>
-            <a:r>
-              <a:rPr kumimoji="0" lang="es-ES" sz="1000" b="0" i="0" u="none" strike="noStrike" cap="none" normalizeH="0" baseline="0" dirty="0" smtClean="0">
-                <a:ln>
-                  <a:noFill/>
-                </a:ln>
-                <a:solidFill>
-                  <a:srgbClr val="008000"/>
-                </a:solidFill>
-                <a:effectLst/>
-                <a:latin typeface="Courier New" pitchFamily="49" charset="0"/>
-                <a:ea typeface="Calibri" pitchFamily="34" charset="0"/>
-                <a:cs typeface="Courier New" pitchFamily="49" charset="0"/>
-              </a:rPr>
-              <a:t>//#</a:t>
-            </a:r>
-            <a:r>
-              <a:rPr kumimoji="0" lang="es-ES" sz="1000" b="0" i="0" u="none" strike="noStrike" cap="none" normalizeH="0" baseline="0" dirty="0" err="1" smtClean="0">
-                <a:ln>
-                  <a:noFill/>
-                </a:ln>
-                <a:solidFill>
-                  <a:srgbClr val="008000"/>
-                </a:solidFill>
-                <a:effectLst/>
-                <a:latin typeface="Courier New" pitchFamily="49" charset="0"/>
-                <a:ea typeface="Calibri" pitchFamily="34" charset="0"/>
-                <a:cs typeface="Courier New" pitchFamily="49" charset="0"/>
-              </a:rPr>
-              <a:t>qos</a:t>
-            </a:r>
-            <a:r>
-              <a:rPr kumimoji="0" lang="es-ES" sz="1000" b="0" i="0" u="none" strike="noStrike" cap="none" normalizeH="0" baseline="0" dirty="0" smtClean="0">
-                <a:ln>
-                  <a:noFill/>
-                </a:ln>
-                <a:solidFill>
-                  <a:srgbClr val="008000"/>
-                </a:solidFill>
-                <a:effectLst/>
-                <a:latin typeface="Courier New" pitchFamily="49" charset="0"/>
-                <a:ea typeface="Calibri" pitchFamily="34" charset="0"/>
-                <a:cs typeface="Courier New" pitchFamily="49" charset="0"/>
-              </a:rPr>
+              <a:rPr lang="es-ES" dirty="0" err="1" smtClean="0"/>
+              <a:t>invocations</a:t>
+            </a:r>
+            <a:r>
+              <a:rPr lang="es-ES" dirty="0" smtClean="0"/>
+              <a:t>.</a:t>
+            </a:r>
+          </a:p>
+          <a:p>
+            <a:r>
+              <a:rPr lang="es-ES" dirty="0" smtClean="0"/>
+              <a:t>UDP and TCP </a:t>
+            </a:r>
+            <a:r>
+              <a:rPr lang="es-ES" dirty="0" err="1" smtClean="0"/>
+              <a:t>communications</a:t>
+            </a:r>
+            <a:r>
+              <a:rPr lang="es-ES" dirty="0" smtClean="0"/>
+              <a:t> are </a:t>
+            </a:r>
+            <a:r>
+              <a:rPr lang="es-ES" dirty="0" err="1" smtClean="0"/>
+              <a:t>supported</a:t>
+            </a:r>
+            <a:r>
+              <a:rPr lang="es-ES" dirty="0" smtClean="0"/>
+              <a:t>.</a:t>
+            </a:r>
+          </a:p>
+          <a:p>
+            <a:r>
+              <a:rPr lang="es-ES" dirty="0" err="1" smtClean="0"/>
+              <a:t>Different</a:t>
+            </a:r>
+            <a:r>
+              <a:rPr lang="es-ES" dirty="0" smtClean="0"/>
+              <a:t> server </a:t>
+            </a:r>
+            <a:r>
+              <a:rPr lang="es-ES" dirty="0" err="1" smtClean="0"/>
+              <a:t>strategies</a:t>
+            </a:r>
+            <a:r>
+              <a:rPr lang="es-ES" dirty="0" smtClean="0"/>
               <a:t> </a:t>
             </a:r>
             <a:r>
-              <a:rPr kumimoji="0" lang="es-ES" sz="1000" b="0" i="0" u="none" strike="noStrike" cap="none" normalizeH="0" baseline="0" dirty="0" err="1" smtClean="0">
-                <a:ln>
-                  <a:noFill/>
-                </a:ln>
-                <a:solidFill>
-                  <a:srgbClr val="008000"/>
-                </a:solidFill>
-                <a:effectLst/>
-                <a:latin typeface="Courier New" pitchFamily="49" charset="0"/>
-                <a:ea typeface="Calibri" pitchFamily="34" charset="0"/>
-                <a:cs typeface="Courier New" pitchFamily="49" charset="0"/>
-              </a:rPr>
-              <a:t>Bank_Library</a:t>
-            </a:r>
-            <a:r>
-              <a:rPr kumimoji="0" lang="es-ES" sz="1000" b="0" i="0" u="none" strike="noStrike" cap="none" normalizeH="0" baseline="0" dirty="0" smtClean="0">
-                <a:ln>
-                  <a:noFill/>
-                </a:ln>
-                <a:solidFill>
-                  <a:srgbClr val="008000"/>
-                </a:solidFill>
-                <a:effectLst/>
-                <a:latin typeface="Courier New" pitchFamily="49" charset="0"/>
-                <a:ea typeface="Calibri" pitchFamily="34" charset="0"/>
-                <a:cs typeface="Courier New" pitchFamily="49" charset="0"/>
-              </a:rPr>
+              <a:rPr lang="es-ES" dirty="0" err="1" smtClean="0"/>
+              <a:t>allowed</a:t>
+            </a:r>
+            <a:r>
+              <a:rPr lang="es-ES" dirty="0" smtClean="0"/>
+              <a:t>: </a:t>
+            </a:r>
+            <a:r>
+              <a:rPr lang="es-ES" dirty="0" err="1" smtClean="0"/>
+              <a:t>one-thread</a:t>
+            </a:r>
+            <a:r>
+              <a:rPr lang="es-ES" dirty="0" smtClean="0"/>
               <a:t> </a:t>
             </a:r>
             <a:r>
-              <a:rPr kumimoji="0" lang="es-ES" sz="1000" b="0" i="0" u="none" strike="noStrike" cap="none" normalizeH="0" baseline="0" dirty="0" err="1" smtClean="0">
-                <a:ln>
-                  <a:noFill/>
-                </a:ln>
-                <a:solidFill>
-                  <a:srgbClr val="008000"/>
-                </a:solidFill>
-                <a:effectLst/>
-                <a:latin typeface="Courier New" pitchFamily="49" charset="0"/>
-                <a:ea typeface="Calibri" pitchFamily="34" charset="0"/>
-                <a:cs typeface="Courier New" pitchFamily="49" charset="0"/>
-              </a:rPr>
-              <a:t>Bank_Profile</a:t>
-            </a:r>
-            <a:endParaRPr kumimoji="0" lang="es-ES" sz="1000" b="0" i="0" u="none" strike="noStrike" cap="none" normalizeH="0" baseline="0" dirty="0" smtClean="0">
-              <a:ln>
-                <a:noFill/>
-              </a:ln>
-              <a:solidFill>
-                <a:schemeClr val="tx1"/>
-              </a:solidFill>
-              <a:effectLst/>
-              <a:latin typeface="Arial" pitchFamily="34" charset="0"/>
-              <a:cs typeface="Arial" pitchFamily="34" charset="0"/>
-            </a:endParaRPr>
-          </a:p>
-        </p:txBody>
-      </p:sp>
-      <p:sp>
-        <p:nvSpPr>
-          <p:cNvPr id="6" name="5 Flecha abajo"/>
-          <p:cNvSpPr/>
-          <p:nvPr/>
-        </p:nvSpPr>
-        <p:spPr>
-          <a:xfrm>
-            <a:off x="3779912" y="2852936"/>
-            <a:ext cx="936104" cy="504056"/>
-          </a:xfrm>
-          <a:prstGeom prst="downArrow">
-            <a:avLst/>
-          </a:prstGeom>
-        </p:spPr>
-        <p:style>
-          <a:lnRef idx="2">
-            <a:schemeClr val="accent1">
-              <a:shade val="50000"/>
-            </a:schemeClr>
-          </a:lnRef>
-          <a:fillRef idx="1">
-            <a:schemeClr val="accent1"/>
-          </a:fillRef>
-          <a:effectRef idx="0">
-            <a:schemeClr val="accent1"/>
-          </a:effectRef>
-          <a:fontRef idx="minor">
-            <a:schemeClr val="lt1"/>
-          </a:fontRef>
-        </p:style>
-        <p:txBody>
-          <a:bodyPr rtlCol="0" anchor="ctr"/>
-          <a:lstStyle/>
-          <a:p>
-            <a:pPr algn="ctr"/>
-            <a:endParaRPr lang="es-ES"/>
+              <a:rPr lang="es-ES" dirty="0" err="1" smtClean="0"/>
+              <a:t>strategy</a:t>
+            </a:r>
+            <a:r>
+              <a:rPr lang="es-ES" dirty="0" smtClean="0"/>
+              <a:t>, </a:t>
+            </a:r>
+            <a:r>
+              <a:rPr lang="es-ES" dirty="0" err="1" smtClean="0"/>
+              <a:t>thread-by-request</a:t>
+            </a:r>
+            <a:r>
+              <a:rPr lang="es-ES" dirty="0" smtClean="0"/>
+              <a:t> </a:t>
+            </a:r>
+            <a:r>
+              <a:rPr lang="es-ES" dirty="0" err="1" smtClean="0"/>
+              <a:t>strategy</a:t>
+            </a:r>
+            <a:r>
+              <a:rPr lang="es-ES" dirty="0" smtClean="0"/>
+              <a:t> and </a:t>
+            </a:r>
+            <a:r>
+              <a:rPr lang="es-ES" dirty="0" err="1" smtClean="0"/>
+              <a:t>threadpool</a:t>
+            </a:r>
+            <a:r>
+              <a:rPr lang="es-ES" dirty="0" smtClean="0"/>
+              <a:t> </a:t>
+            </a:r>
+            <a:r>
+              <a:rPr lang="es-ES" dirty="0" err="1" smtClean="0"/>
+              <a:t>strategy</a:t>
+            </a:r>
+            <a:r>
+              <a:rPr lang="es-ES" smtClean="0"/>
+              <a:t>.</a:t>
+            </a:r>
+            <a:endParaRPr lang="es-ES" dirty="0" smtClean="0"/>
+          </a:p>
+          <a:p>
+            <a:r>
+              <a:rPr lang="es-ES" dirty="0" smtClean="0"/>
+              <a:t>Use </a:t>
+            </a:r>
+            <a:r>
+              <a:rPr lang="es-ES" dirty="0" err="1" smtClean="0"/>
+              <a:t>standard</a:t>
+            </a:r>
+            <a:r>
+              <a:rPr lang="es-ES" dirty="0" smtClean="0"/>
+              <a:t> DDS API. </a:t>
+            </a:r>
+            <a:r>
+              <a:rPr lang="es-ES" dirty="0" err="1" smtClean="0"/>
+              <a:t>OpenDDS</a:t>
+            </a:r>
+            <a:r>
+              <a:rPr lang="es-ES" dirty="0" smtClean="0"/>
+              <a:t> </a:t>
+            </a:r>
+            <a:r>
+              <a:rPr lang="es-ES" dirty="0" err="1" smtClean="0"/>
+              <a:t>is</a:t>
+            </a:r>
+            <a:r>
+              <a:rPr lang="es-ES" dirty="0" smtClean="0"/>
+              <a:t> </a:t>
+            </a:r>
+            <a:r>
+              <a:rPr lang="es-ES" dirty="0" err="1" smtClean="0"/>
+              <a:t>supported</a:t>
+            </a:r>
+            <a:r>
+              <a:rPr lang="es-ES" dirty="0" smtClean="0"/>
+              <a:t>.</a:t>
+            </a:r>
+            <a:endParaRPr lang="es-ES" dirty="0"/>
           </a:p>
         </p:txBody>
       </p:sp>

</xml_diff>